<commit_message>
add update to 3 files for update password function
</commit_message>
<xml_diff>
--- a/spec/PHP_Training_Task17060_DesignApps(Regedit)_Ver_0.1.1.pptx
+++ b/spec/PHP_Training_Task17060_DesignApps(Regedit)_Ver_0.1.1.pptx
@@ -6,6 +6,7 @@
   </p:sldMasterIdLst>
   <p:sldIdLst>
     <p:sldId id="256" r:id="rId2"/>
+    <p:sldId id="257" r:id="rId3"/>
   </p:sldIdLst>
   <p:sldSz cx="6858000" cy="9144000" type="screen4x3"/>
   <p:notesSz cx="6858000" cy="9144000"/>
@@ -288,7 +289,7 @@
           <a:p>
             <a:fld id="{303CFF4D-8D22-5B44-9F89-D3FEF775BD3F}" type="datetimeFigureOut">
               <a:rPr lang="en-US" smtClean="0"/>
-              <a:t>8/26/14</a:t>
+              <a:t>8/27/14</a:t>
             </a:fld>
             <a:endParaRPr lang="en-US"/>
           </a:p>
@@ -458,7 +459,7 @@
           <a:p>
             <a:fld id="{303CFF4D-8D22-5B44-9F89-D3FEF775BD3F}" type="datetimeFigureOut">
               <a:rPr lang="en-US" smtClean="0"/>
-              <a:t>8/26/14</a:t>
+              <a:t>8/27/14</a:t>
             </a:fld>
             <a:endParaRPr lang="en-US"/>
           </a:p>
@@ -638,7 +639,7 @@
           <a:p>
             <a:fld id="{303CFF4D-8D22-5B44-9F89-D3FEF775BD3F}" type="datetimeFigureOut">
               <a:rPr lang="en-US" smtClean="0"/>
-              <a:t>8/26/14</a:t>
+              <a:t>8/27/14</a:t>
             </a:fld>
             <a:endParaRPr lang="en-US"/>
           </a:p>
@@ -808,7 +809,7 @@
           <a:p>
             <a:fld id="{303CFF4D-8D22-5B44-9F89-D3FEF775BD3F}" type="datetimeFigureOut">
               <a:rPr lang="en-US" smtClean="0"/>
-              <a:t>8/26/14</a:t>
+              <a:t>8/27/14</a:t>
             </a:fld>
             <a:endParaRPr lang="en-US"/>
           </a:p>
@@ -1054,7 +1055,7 @@
           <a:p>
             <a:fld id="{303CFF4D-8D22-5B44-9F89-D3FEF775BD3F}" type="datetimeFigureOut">
               <a:rPr lang="en-US" smtClean="0"/>
-              <a:t>8/26/14</a:t>
+              <a:t>8/27/14</a:t>
             </a:fld>
             <a:endParaRPr lang="en-US"/>
           </a:p>
@@ -1342,7 +1343,7 @@
           <a:p>
             <a:fld id="{303CFF4D-8D22-5B44-9F89-D3FEF775BD3F}" type="datetimeFigureOut">
               <a:rPr lang="en-US" smtClean="0"/>
-              <a:t>8/26/14</a:t>
+              <a:t>8/27/14</a:t>
             </a:fld>
             <a:endParaRPr lang="en-US"/>
           </a:p>
@@ -1769,7 +1770,7 @@
           <a:p>
             <a:fld id="{303CFF4D-8D22-5B44-9F89-D3FEF775BD3F}" type="datetimeFigureOut">
               <a:rPr lang="en-US" smtClean="0"/>
-              <a:t>8/26/14</a:t>
+              <a:t>8/27/14</a:t>
             </a:fld>
             <a:endParaRPr lang="en-US"/>
           </a:p>
@@ -1887,7 +1888,7 @@
           <a:p>
             <a:fld id="{303CFF4D-8D22-5B44-9F89-D3FEF775BD3F}" type="datetimeFigureOut">
               <a:rPr lang="en-US" smtClean="0"/>
-              <a:t>8/26/14</a:t>
+              <a:t>8/27/14</a:t>
             </a:fld>
             <a:endParaRPr lang="en-US"/>
           </a:p>
@@ -1982,7 +1983,7 @@
           <a:p>
             <a:fld id="{303CFF4D-8D22-5B44-9F89-D3FEF775BD3F}" type="datetimeFigureOut">
               <a:rPr lang="en-US" smtClean="0"/>
-              <a:t>8/26/14</a:t>
+              <a:t>8/27/14</a:t>
             </a:fld>
             <a:endParaRPr lang="en-US"/>
           </a:p>
@@ -2259,7 +2260,7 @@
           <a:p>
             <a:fld id="{303CFF4D-8D22-5B44-9F89-D3FEF775BD3F}" type="datetimeFigureOut">
               <a:rPr lang="en-US" smtClean="0"/>
-              <a:t>8/26/14</a:t>
+              <a:t>8/27/14</a:t>
             </a:fld>
             <a:endParaRPr lang="en-US"/>
           </a:p>
@@ -2512,7 +2513,7 @@
           <a:p>
             <a:fld id="{303CFF4D-8D22-5B44-9F89-D3FEF775BD3F}" type="datetimeFigureOut">
               <a:rPr lang="en-US" smtClean="0"/>
-              <a:t>8/26/14</a:t>
+              <a:t>8/27/14</a:t>
             </a:fld>
             <a:endParaRPr lang="en-US"/>
           </a:p>
@@ -2725,7 +2726,7 @@
           <a:p>
             <a:fld id="{303CFF4D-8D22-5B44-9F89-D3FEF775BD3F}" type="datetimeFigureOut">
               <a:rPr lang="en-US" smtClean="0"/>
-              <a:t>8/26/14</a:t>
+              <a:t>8/27/14</a:t>
             </a:fld>
             <a:endParaRPr lang="en-US"/>
           </a:p>
@@ -5519,6 +5520,2214 @@
     <p:extLst>
       <p:ext uri="{BB962C8B-B14F-4D97-AF65-F5344CB8AC3E}">
         <p14:creationId xmlns:p14="http://schemas.microsoft.com/office/powerpoint/2010/main" val="1403617963"/>
+      </p:ext>
+    </p:extLst>
+  </p:cSld>
+  <p:clrMapOvr>
+    <a:masterClrMapping/>
+  </p:clrMapOvr>
+  <p:timing>
+    <p:tnLst>
+      <p:par>
+        <p:cTn xmlns:p14="http://schemas.microsoft.com/office/powerpoint/2010/main" id="1" dur="indefinite" restart="never" nodeType="tmRoot"/>
+      </p:par>
+    </p:tnLst>
+  </p:timing>
+</p:sld>
+</file>
+
+<file path=ppt/slides/slide2.xml><?xml version="1.0" encoding="utf-8"?>
+<p:sld xmlns:a="http://schemas.openxmlformats.org/drawingml/2006/main" xmlns:r="http://schemas.openxmlformats.org/officeDocument/2006/relationships" xmlns:p="http://schemas.openxmlformats.org/presentationml/2006/main">
+  <p:cSld>
+    <p:spTree>
+      <p:nvGrpSpPr>
+        <p:cNvPr id="1" name=""/>
+        <p:cNvGrpSpPr/>
+        <p:nvPr/>
+      </p:nvGrpSpPr>
+      <p:grpSpPr>
+        <a:xfrm>
+          <a:off x="0" y="0"/>
+          <a:ext cx="0" cy="0"/>
+          <a:chOff x="0" y="0"/>
+          <a:chExt cx="0" cy="0"/>
+        </a:xfrm>
+      </p:grpSpPr>
+      <p:sp>
+        <p:nvSpPr>
+          <p:cNvPr id="16" name="TextBox 15"/>
+          <p:cNvSpPr txBox="1"/>
+          <p:nvPr/>
+        </p:nvSpPr>
+        <p:spPr>
+          <a:xfrm>
+            <a:off x="3924302" y="2288933"/>
+            <a:ext cx="416625" cy="369332"/>
+          </a:xfrm>
+          <a:prstGeom prst="rect">
+            <a:avLst/>
+          </a:prstGeom>
+          <a:noFill/>
+        </p:spPr>
+        <p:txBody>
+          <a:bodyPr wrap="none" rtlCol="0">
+            <a:spAutoFit/>
+          </a:bodyPr>
+          <a:lstStyle/>
+          <a:p>
+            <a:r>
+              <a:rPr lang="en-US" dirty="0" smtClean="0"/>
+              <a:t>#3</a:t>
+            </a:r>
+            <a:endParaRPr lang="en-US" dirty="0"/>
+          </a:p>
+        </p:txBody>
+      </p:sp>
+      <p:sp>
+        <p:nvSpPr>
+          <p:cNvPr id="4" name="Rectangle 3"/>
+          <p:cNvSpPr/>
+          <p:nvPr/>
+        </p:nvSpPr>
+        <p:spPr>
+          <a:xfrm>
+            <a:off x="561977" y="832028"/>
+            <a:ext cx="3120941" cy="4430852"/>
+          </a:xfrm>
+          <a:prstGeom prst="rect">
+            <a:avLst/>
+          </a:prstGeom>
+          <a:solidFill>
+            <a:schemeClr val="bg1"/>
+          </a:solidFill>
+        </p:spPr>
+        <p:style>
+          <a:lnRef idx="1">
+            <a:schemeClr val="accent1"/>
+          </a:lnRef>
+          <a:fillRef idx="3">
+            <a:schemeClr val="accent1"/>
+          </a:fillRef>
+          <a:effectRef idx="2">
+            <a:schemeClr val="accent1"/>
+          </a:effectRef>
+          <a:fontRef idx="minor">
+            <a:schemeClr val="lt1"/>
+          </a:fontRef>
+        </p:style>
+        <p:txBody>
+          <a:bodyPr rtlCol="0" anchor="ctr"/>
+          <a:lstStyle/>
+          <a:p>
+            <a:pPr algn="ctr"/>
+            <a:endParaRPr lang="en-US" dirty="0"/>
+          </a:p>
+        </p:txBody>
+      </p:sp>
+      <p:sp>
+        <p:nvSpPr>
+          <p:cNvPr id="5" name="TextBox 4"/>
+          <p:cNvSpPr txBox="1"/>
+          <p:nvPr/>
+        </p:nvSpPr>
+        <p:spPr>
+          <a:xfrm>
+            <a:off x="1204634" y="1065766"/>
+            <a:ext cx="1981200" cy="369332"/>
+          </a:xfrm>
+          <a:prstGeom prst="rect">
+            <a:avLst/>
+          </a:prstGeom>
+          <a:noFill/>
+        </p:spPr>
+        <p:txBody>
+          <a:bodyPr wrap="square" rtlCol="0">
+            <a:spAutoFit/>
+          </a:bodyPr>
+          <a:lstStyle/>
+          <a:p>
+            <a:pPr algn="ctr"/>
+            <a:r>
+              <a:rPr lang="en-US" dirty="0" smtClean="0"/>
+              <a:t>Update Password</a:t>
+            </a:r>
+            <a:endParaRPr lang="en-US" dirty="0"/>
+          </a:p>
+        </p:txBody>
+      </p:sp>
+      <p:sp>
+        <p:nvSpPr>
+          <p:cNvPr id="6" name="TextBox 5"/>
+          <p:cNvSpPr txBox="1"/>
+          <p:nvPr/>
+        </p:nvSpPr>
+        <p:spPr>
+          <a:xfrm>
+            <a:off x="631908" y="1660960"/>
+            <a:ext cx="741636" cy="276999"/>
+          </a:xfrm>
+          <a:prstGeom prst="rect">
+            <a:avLst/>
+          </a:prstGeom>
+          <a:noFill/>
+        </p:spPr>
+        <p:txBody>
+          <a:bodyPr wrap="square" rtlCol="0">
+            <a:spAutoFit/>
+          </a:bodyPr>
+          <a:lstStyle/>
+          <a:p>
+            <a:r>
+              <a:rPr lang="en-US" sz="1200" dirty="0" smtClean="0"/>
+              <a:t>Old Pass</a:t>
+            </a:r>
+            <a:r>
+              <a:rPr lang="en-US" sz="1200" dirty="0" smtClean="0"/>
+              <a:t>:</a:t>
+            </a:r>
+            <a:endParaRPr lang="en-US" sz="1200" dirty="0"/>
+          </a:p>
+        </p:txBody>
+      </p:sp>
+      <p:sp>
+        <p:nvSpPr>
+          <p:cNvPr id="7" name="Rectangle 6"/>
+          <p:cNvSpPr/>
+          <p:nvPr/>
+        </p:nvSpPr>
+        <p:spPr>
+          <a:xfrm>
+            <a:off x="1391920" y="1663698"/>
+            <a:ext cx="1950262" cy="274261"/>
+          </a:xfrm>
+          <a:prstGeom prst="rect">
+            <a:avLst/>
+          </a:prstGeom>
+          <a:ln w="3175" cmpd="sng">
+            <a:solidFill>
+              <a:srgbClr val="000000"/>
+            </a:solidFill>
+          </a:ln>
+        </p:spPr>
+        <p:style>
+          <a:lnRef idx="2">
+            <a:schemeClr val="accent6"/>
+          </a:lnRef>
+          <a:fillRef idx="1">
+            <a:schemeClr val="lt1"/>
+          </a:fillRef>
+          <a:effectRef idx="0">
+            <a:schemeClr val="accent6"/>
+          </a:effectRef>
+          <a:fontRef idx="minor">
+            <a:schemeClr val="dk1"/>
+          </a:fontRef>
+        </p:style>
+        <p:txBody>
+          <a:bodyPr rtlCol="0" anchor="ctr"/>
+          <a:lstStyle/>
+          <a:p>
+            <a:pPr algn="ctr"/>
+            <a:endParaRPr lang="en-US"/>
+          </a:p>
+        </p:txBody>
+      </p:sp>
+      <p:sp>
+        <p:nvSpPr>
+          <p:cNvPr id="8" name="TextBox 7"/>
+          <p:cNvSpPr txBox="1"/>
+          <p:nvPr/>
+        </p:nvSpPr>
+        <p:spPr>
+          <a:xfrm>
+            <a:off x="549274" y="2303447"/>
+            <a:ext cx="954406" cy="276999"/>
+          </a:xfrm>
+          <a:prstGeom prst="rect">
+            <a:avLst/>
+          </a:prstGeom>
+          <a:noFill/>
+        </p:spPr>
+        <p:txBody>
+          <a:bodyPr wrap="square" rtlCol="0">
+            <a:spAutoFit/>
+          </a:bodyPr>
+          <a:lstStyle/>
+          <a:p>
+            <a:r>
+              <a:rPr lang="en-US" sz="1200" dirty="0"/>
+              <a:t>Pass again</a:t>
+            </a:r>
+            <a:r>
+              <a:rPr lang="en-US" sz="1200" dirty="0" smtClean="0"/>
+              <a:t>:</a:t>
+            </a:r>
+            <a:endParaRPr lang="en-US" sz="1200" dirty="0"/>
+          </a:p>
+        </p:txBody>
+      </p:sp>
+      <p:sp>
+        <p:nvSpPr>
+          <p:cNvPr id="9" name="Rectangle 8"/>
+          <p:cNvSpPr/>
+          <p:nvPr/>
+        </p:nvSpPr>
+        <p:spPr>
+          <a:xfrm>
+            <a:off x="1391920" y="2368654"/>
+            <a:ext cx="1950262" cy="289560"/>
+          </a:xfrm>
+          <a:prstGeom prst="rect">
+            <a:avLst/>
+          </a:prstGeom>
+          <a:ln w="3175" cmpd="sng">
+            <a:solidFill>
+              <a:srgbClr val="000000"/>
+            </a:solidFill>
+          </a:ln>
+        </p:spPr>
+        <p:style>
+          <a:lnRef idx="2">
+            <a:schemeClr val="accent6"/>
+          </a:lnRef>
+          <a:fillRef idx="1">
+            <a:schemeClr val="lt1"/>
+          </a:fillRef>
+          <a:effectRef idx="0">
+            <a:schemeClr val="accent6"/>
+          </a:effectRef>
+          <a:fontRef idx="minor">
+            <a:schemeClr val="dk1"/>
+          </a:fontRef>
+        </p:style>
+        <p:txBody>
+          <a:bodyPr rtlCol="0" anchor="ctr"/>
+          <a:lstStyle/>
+          <a:p>
+            <a:pPr algn="ctr"/>
+            <a:endParaRPr lang="en-US"/>
+          </a:p>
+        </p:txBody>
+      </p:sp>
+      <p:sp>
+        <p:nvSpPr>
+          <p:cNvPr id="12" name="Rounded Rectangle 11"/>
+          <p:cNvSpPr/>
+          <p:nvPr/>
+        </p:nvSpPr>
+        <p:spPr>
+          <a:xfrm>
+            <a:off x="1107521" y="3320174"/>
+            <a:ext cx="1079500" cy="355600"/>
+          </a:xfrm>
+          <a:prstGeom prst="roundRect">
+            <a:avLst/>
+          </a:prstGeom>
+        </p:spPr>
+        <p:style>
+          <a:lnRef idx="1">
+            <a:schemeClr val="accent1"/>
+          </a:lnRef>
+          <a:fillRef idx="3">
+            <a:schemeClr val="accent1"/>
+          </a:fillRef>
+          <a:effectRef idx="2">
+            <a:schemeClr val="accent1"/>
+          </a:effectRef>
+          <a:fontRef idx="minor">
+            <a:schemeClr val="lt1"/>
+          </a:fontRef>
+        </p:style>
+        <p:txBody>
+          <a:bodyPr rtlCol="0" anchor="ctr"/>
+          <a:lstStyle/>
+          <a:p>
+            <a:pPr algn="ctr"/>
+            <a:r>
+              <a:rPr lang="en-US" sz="1400" dirty="0" smtClean="0"/>
+              <a:t>Cancel</a:t>
+            </a:r>
+            <a:endParaRPr lang="en-US" sz="1400" dirty="0"/>
+          </a:p>
+        </p:txBody>
+      </p:sp>
+      <p:sp>
+        <p:nvSpPr>
+          <p:cNvPr id="13" name="Rounded Rectangle 12"/>
+          <p:cNvSpPr/>
+          <p:nvPr/>
+        </p:nvSpPr>
+        <p:spPr>
+          <a:xfrm>
+            <a:off x="2288621" y="3332874"/>
+            <a:ext cx="1066800" cy="342900"/>
+          </a:xfrm>
+          <a:prstGeom prst="roundRect">
+            <a:avLst/>
+          </a:prstGeom>
+        </p:spPr>
+        <p:style>
+          <a:lnRef idx="1">
+            <a:schemeClr val="accent1"/>
+          </a:lnRef>
+          <a:fillRef idx="3">
+            <a:schemeClr val="accent1"/>
+          </a:fillRef>
+          <a:effectRef idx="2">
+            <a:schemeClr val="accent1"/>
+          </a:effectRef>
+          <a:fontRef idx="minor">
+            <a:schemeClr val="lt1"/>
+          </a:fontRef>
+        </p:style>
+        <p:txBody>
+          <a:bodyPr rtlCol="0" anchor="ctr"/>
+          <a:lstStyle/>
+          <a:p>
+            <a:pPr algn="ctr"/>
+            <a:r>
+              <a:rPr lang="en-US" sz="1400" dirty="0" smtClean="0"/>
+              <a:t>Update</a:t>
+            </a:r>
+            <a:endParaRPr lang="en-US" sz="1400" dirty="0"/>
+          </a:p>
+        </p:txBody>
+      </p:sp>
+      <p:sp>
+        <p:nvSpPr>
+          <p:cNvPr id="15" name="TextBox 14"/>
+          <p:cNvSpPr txBox="1"/>
+          <p:nvPr/>
+        </p:nvSpPr>
+        <p:spPr>
+          <a:xfrm>
+            <a:off x="3965023" y="1620833"/>
+            <a:ext cx="416625" cy="369332"/>
+          </a:xfrm>
+          <a:prstGeom prst="rect">
+            <a:avLst/>
+          </a:prstGeom>
+          <a:noFill/>
+        </p:spPr>
+        <p:txBody>
+          <a:bodyPr wrap="none" rtlCol="0">
+            <a:spAutoFit/>
+          </a:bodyPr>
+          <a:lstStyle/>
+          <a:p>
+            <a:r>
+              <a:rPr lang="en-US" dirty="0" smtClean="0"/>
+              <a:t>#1</a:t>
+            </a:r>
+            <a:endParaRPr lang="en-US" dirty="0"/>
+          </a:p>
+        </p:txBody>
+      </p:sp>
+      <p:cxnSp>
+        <p:nvCxnSpPr>
+          <p:cNvPr id="20" name="Straight Arrow Connector 19"/>
+          <p:cNvCxnSpPr/>
+          <p:nvPr/>
+        </p:nvCxnSpPr>
+        <p:spPr>
+          <a:xfrm>
+            <a:off x="3384550" y="2483877"/>
+            <a:ext cx="609600" cy="0"/>
+          </a:xfrm>
+          <a:prstGeom prst="straightConnector1">
+            <a:avLst/>
+          </a:prstGeom>
+          <a:ln w="3175" cmpd="sng">
+            <a:solidFill>
+              <a:srgbClr val="000000"/>
+            </a:solidFill>
+            <a:headEnd type="none"/>
+            <a:tailEnd type="arrow"/>
+          </a:ln>
+          <a:effectLst/>
+        </p:spPr>
+        <p:style>
+          <a:lnRef idx="2">
+            <a:schemeClr val="accent1"/>
+          </a:lnRef>
+          <a:fillRef idx="0">
+            <a:schemeClr val="accent1"/>
+          </a:fillRef>
+          <a:effectRef idx="1">
+            <a:schemeClr val="accent1"/>
+          </a:effectRef>
+          <a:fontRef idx="minor">
+            <a:schemeClr val="tx1"/>
+          </a:fontRef>
+        </p:style>
+      </p:cxnSp>
+      <p:cxnSp>
+        <p:nvCxnSpPr>
+          <p:cNvPr id="22" name="Straight Arrow Connector 21"/>
+          <p:cNvCxnSpPr/>
+          <p:nvPr/>
+        </p:nvCxnSpPr>
+        <p:spPr>
+          <a:xfrm>
+            <a:off x="3395384" y="1808874"/>
+            <a:ext cx="609600" cy="0"/>
+          </a:xfrm>
+          <a:prstGeom prst="straightConnector1">
+            <a:avLst/>
+          </a:prstGeom>
+          <a:ln w="3175" cmpd="sng">
+            <a:solidFill>
+              <a:srgbClr val="000000"/>
+            </a:solidFill>
+            <a:headEnd type="none"/>
+            <a:tailEnd type="arrow"/>
+          </a:ln>
+          <a:effectLst/>
+        </p:spPr>
+        <p:style>
+          <a:lnRef idx="2">
+            <a:schemeClr val="accent1"/>
+          </a:lnRef>
+          <a:fillRef idx="0">
+            <a:schemeClr val="accent1"/>
+          </a:fillRef>
+          <a:effectRef idx="1">
+            <a:schemeClr val="accent1"/>
+          </a:effectRef>
+          <a:fontRef idx="minor">
+            <a:schemeClr val="tx1"/>
+          </a:fontRef>
+        </p:style>
+      </p:cxnSp>
+      <p:cxnSp>
+        <p:nvCxnSpPr>
+          <p:cNvPr id="23" name="Straight Arrow Connector 22"/>
+          <p:cNvCxnSpPr>
+            <a:endCxn id="31" idx="3"/>
+          </p:cNvCxnSpPr>
+          <p:nvPr/>
+        </p:nvCxnSpPr>
+        <p:spPr>
+          <a:xfrm flipH="1">
+            <a:off x="520148" y="3523375"/>
+            <a:ext cx="511177" cy="6865"/>
+          </a:xfrm>
+          <a:prstGeom prst="straightConnector1">
+            <a:avLst/>
+          </a:prstGeom>
+          <a:ln w="3175" cmpd="sng">
+            <a:solidFill>
+              <a:srgbClr val="000000"/>
+            </a:solidFill>
+            <a:headEnd type="none"/>
+            <a:tailEnd type="arrow"/>
+          </a:ln>
+          <a:effectLst/>
+        </p:spPr>
+        <p:style>
+          <a:lnRef idx="2">
+            <a:schemeClr val="accent1"/>
+          </a:lnRef>
+          <a:fillRef idx="0">
+            <a:schemeClr val="accent1"/>
+          </a:fillRef>
+          <a:effectRef idx="1">
+            <a:schemeClr val="accent1"/>
+          </a:effectRef>
+          <a:fontRef idx="minor">
+            <a:schemeClr val="tx1"/>
+          </a:fontRef>
+        </p:style>
+      </p:cxnSp>
+      <p:sp>
+        <p:nvSpPr>
+          <p:cNvPr id="30" name="TextBox 29"/>
+          <p:cNvSpPr txBox="1"/>
+          <p:nvPr/>
+        </p:nvSpPr>
+        <p:spPr>
+          <a:xfrm>
+            <a:off x="3965023" y="3345574"/>
+            <a:ext cx="416625" cy="369332"/>
+          </a:xfrm>
+          <a:prstGeom prst="rect">
+            <a:avLst/>
+          </a:prstGeom>
+          <a:noFill/>
+        </p:spPr>
+        <p:txBody>
+          <a:bodyPr wrap="none" rtlCol="0">
+            <a:spAutoFit/>
+          </a:bodyPr>
+          <a:lstStyle/>
+          <a:p>
+            <a:r>
+              <a:rPr lang="en-US" dirty="0" smtClean="0"/>
+              <a:t>#5</a:t>
+            </a:r>
+            <a:endParaRPr lang="en-US" dirty="0"/>
+          </a:p>
+        </p:txBody>
+      </p:sp>
+      <p:sp>
+        <p:nvSpPr>
+          <p:cNvPr id="31" name="TextBox 30"/>
+          <p:cNvSpPr txBox="1"/>
+          <p:nvPr/>
+        </p:nvSpPr>
+        <p:spPr>
+          <a:xfrm>
+            <a:off x="103523" y="3345574"/>
+            <a:ext cx="416625" cy="369332"/>
+          </a:xfrm>
+          <a:prstGeom prst="rect">
+            <a:avLst/>
+          </a:prstGeom>
+          <a:noFill/>
+        </p:spPr>
+        <p:txBody>
+          <a:bodyPr wrap="none" rtlCol="0">
+            <a:spAutoFit/>
+          </a:bodyPr>
+          <a:lstStyle/>
+          <a:p>
+            <a:r>
+              <a:rPr lang="en-US" dirty="0" smtClean="0"/>
+              <a:t>#4</a:t>
+            </a:r>
+            <a:endParaRPr lang="en-US" dirty="0"/>
+          </a:p>
+        </p:txBody>
+      </p:sp>
+      <p:cxnSp>
+        <p:nvCxnSpPr>
+          <p:cNvPr id="33" name="Straight Arrow Connector 32"/>
+          <p:cNvCxnSpPr/>
+          <p:nvPr/>
+        </p:nvCxnSpPr>
+        <p:spPr>
+          <a:xfrm>
+            <a:off x="3387087" y="3523374"/>
+            <a:ext cx="609600" cy="0"/>
+          </a:xfrm>
+          <a:prstGeom prst="straightConnector1">
+            <a:avLst/>
+          </a:prstGeom>
+          <a:ln w="3175" cmpd="sng">
+            <a:solidFill>
+              <a:srgbClr val="000000"/>
+            </a:solidFill>
+            <a:headEnd type="none"/>
+            <a:tailEnd type="arrow"/>
+          </a:ln>
+          <a:effectLst/>
+        </p:spPr>
+        <p:style>
+          <a:lnRef idx="2">
+            <a:schemeClr val="accent1"/>
+          </a:lnRef>
+          <a:fillRef idx="0">
+            <a:schemeClr val="accent1"/>
+          </a:fillRef>
+          <a:effectRef idx="1">
+            <a:schemeClr val="accent1"/>
+          </a:effectRef>
+          <a:fontRef idx="minor">
+            <a:schemeClr val="tx1"/>
+          </a:fontRef>
+        </p:style>
+      </p:cxnSp>
+      <p:graphicFrame>
+        <p:nvGraphicFramePr>
+          <p:cNvPr id="36" name="Table 35"/>
+          <p:cNvGraphicFramePr>
+            <a:graphicFrameLocks noGrp="1"/>
+          </p:cNvGraphicFramePr>
+          <p:nvPr>
+            <p:extLst>
+              <p:ext uri="{D42A27DB-BD31-4B8C-83A1-F6EECF244321}">
+                <p14:modId xmlns:p14="http://schemas.microsoft.com/office/powerpoint/2010/main" val="761894575"/>
+              </p:ext>
+            </p:extLst>
+          </p:nvPr>
+        </p:nvGraphicFramePr>
+        <p:xfrm>
+          <a:off x="4340927" y="806629"/>
+          <a:ext cx="2310805" cy="1012079"/>
+        </p:xfrm>
+        <a:graphic>
+          <a:graphicData uri="http://schemas.openxmlformats.org/drawingml/2006/table">
+            <a:tbl>
+              <a:tblPr firstRow="1" bandRow="1">
+                <a:tableStyleId>{5C22544A-7EE6-4342-B048-85BDC9FD1C3A}</a:tableStyleId>
+              </a:tblPr>
+              <a:tblGrid>
+                <a:gridCol w="1277553"/>
+                <a:gridCol w="1033252"/>
+              </a:tblGrid>
+              <a:tr h="463439">
+                <a:tc>
+                  <a:txBody>
+                    <a:bodyPr/>
+                    <a:lstStyle/>
+                    <a:p>
+                      <a:pPr algn="ctr"/>
+                      <a:r>
+                        <a:rPr lang="en-US" sz="1200" dirty="0" smtClean="0"/>
+                        <a:t>Parameter</a:t>
+                      </a:r>
+                      <a:endParaRPr lang="en-US" sz="1200" dirty="0"/>
+                    </a:p>
+                  </a:txBody>
+                  <a:tcPr marT="91440" marB="91440"/>
+                </a:tc>
+                <a:tc>
+                  <a:txBody>
+                    <a:bodyPr/>
+                    <a:lstStyle/>
+                    <a:p>
+                      <a:pPr algn="ctr"/>
+                      <a:r>
+                        <a:rPr lang="en-US" sz="1200" dirty="0" smtClean="0"/>
+                        <a:t>Type</a:t>
+                      </a:r>
+                      <a:endParaRPr lang="en-US" sz="1200" dirty="0"/>
+                    </a:p>
+                  </a:txBody>
+                  <a:tcPr marT="91440" marB="91440"/>
+                </a:tc>
+              </a:tr>
+              <a:tr h="462715">
+                <a:tc>
+                  <a:txBody>
+                    <a:bodyPr/>
+                    <a:lstStyle/>
+                    <a:p>
+                      <a:r>
+                        <a:rPr lang="en-US" sz="1200" dirty="0" smtClean="0"/>
+                        <a:t>Old Pass/New Pass/Pass </a:t>
+                      </a:r>
+                      <a:r>
+                        <a:rPr lang="en-US" sz="1200" dirty="0" smtClean="0"/>
+                        <a:t>again</a:t>
+                      </a:r>
+                      <a:endParaRPr lang="en-US" sz="1200" dirty="0"/>
+                    </a:p>
+                  </a:txBody>
+                  <a:tcPr marT="91440" marB="91440"/>
+                </a:tc>
+                <a:tc>
+                  <a:txBody>
+                    <a:bodyPr/>
+                    <a:lstStyle/>
+                    <a:p>
+                      <a:pPr algn="ctr"/>
+                      <a:r>
+                        <a:rPr lang="en-US" sz="1200" dirty="0" err="1" smtClean="0"/>
+                        <a:t>Varchar</a:t>
+                      </a:r>
+                      <a:r>
+                        <a:rPr lang="en-US" sz="1200" dirty="0" smtClean="0"/>
+                        <a:t>(6)</a:t>
+                      </a:r>
+                      <a:endParaRPr lang="en-US" sz="1200" dirty="0"/>
+                    </a:p>
+                  </a:txBody>
+                  <a:tcPr marT="91440" marB="91440"/>
+                </a:tc>
+              </a:tr>
+            </a:tbl>
+          </a:graphicData>
+        </a:graphic>
+      </p:graphicFrame>
+      <p:sp>
+        <p:nvSpPr>
+          <p:cNvPr id="37" name="TextBox 36"/>
+          <p:cNvSpPr txBox="1"/>
+          <p:nvPr/>
+        </p:nvSpPr>
+        <p:spPr>
+          <a:xfrm>
+            <a:off x="4257917" y="395076"/>
+            <a:ext cx="2153043" cy="295934"/>
+          </a:xfrm>
+          <a:prstGeom prst="rect">
+            <a:avLst/>
+          </a:prstGeom>
+          <a:noFill/>
+        </p:spPr>
+        <p:txBody>
+          <a:bodyPr wrap="square" lIns="140671" tIns="70336" rIns="140671" bIns="70336" rtlCol="0">
+            <a:spAutoFit/>
+          </a:bodyPr>
+          <a:lstStyle/>
+          <a:p>
+            <a:r>
+              <a:rPr lang="en-US" sz="1000" dirty="0" smtClean="0">
+                <a:latin typeface="Tahoma"/>
+                <a:cs typeface="Tahoma"/>
+              </a:rPr>
+              <a:t>Using </a:t>
+            </a:r>
+            <a:r>
+              <a:rPr lang="en-US" altLang="ja-JP" sz="1000" dirty="0" smtClean="0">
+                <a:latin typeface="Tahoma"/>
+                <a:ea typeface="メイリオ"/>
+                <a:cs typeface="Tahoma"/>
+              </a:rPr>
+              <a:t>API: regedit</a:t>
+            </a:r>
+            <a:endParaRPr lang="en-US" sz="1000" dirty="0">
+              <a:latin typeface="Tahoma"/>
+              <a:cs typeface="Tahoma"/>
+            </a:endParaRPr>
+          </a:p>
+        </p:txBody>
+      </p:sp>
+      <p:sp>
+        <p:nvSpPr>
+          <p:cNvPr id="38" name="Rectangle 37"/>
+          <p:cNvSpPr/>
+          <p:nvPr/>
+        </p:nvSpPr>
+        <p:spPr>
+          <a:xfrm>
+            <a:off x="4358114" y="2958206"/>
+            <a:ext cx="2310808" cy="1069874"/>
+          </a:xfrm>
+          <a:prstGeom prst="rect">
+            <a:avLst/>
+          </a:prstGeom>
+        </p:spPr>
+        <p:style>
+          <a:lnRef idx="2">
+            <a:schemeClr val="accent3"/>
+          </a:lnRef>
+          <a:fillRef idx="1">
+            <a:schemeClr val="lt1"/>
+          </a:fillRef>
+          <a:effectRef idx="0">
+            <a:schemeClr val="accent3"/>
+          </a:effectRef>
+          <a:fontRef idx="minor">
+            <a:schemeClr val="dk1"/>
+          </a:fontRef>
+        </p:style>
+        <p:txBody>
+          <a:bodyPr lIns="140671" tIns="70336" rIns="140671" bIns="70336" spcCol="0" rtlCol="0" anchor="ctr"/>
+          <a:lstStyle/>
+          <a:p>
+            <a:pPr marL="439598" indent="-439598" algn="just">
+              <a:buFont typeface="Wingdings" charset="2"/>
+              <a:buChar char="ü"/>
+            </a:pPr>
+            <a:r>
+              <a:rPr lang="en-US" altLang="ja-JP" sz="1200" kern="0" dirty="0" smtClean="0">
+                <a:solidFill>
+                  <a:schemeClr val="tx1"/>
+                </a:solidFill>
+                <a:latin typeface="Tahoma"/>
+                <a:ea typeface="メイリオ"/>
+                <a:cs typeface="Tahoma"/>
+              </a:rPr>
+              <a:t>Old Pass/New Pass/</a:t>
+            </a:r>
+            <a:r>
+              <a:rPr lang="en-US" altLang="ja-JP" sz="1200" kern="0" dirty="0">
+                <a:solidFill>
+                  <a:schemeClr val="tx1"/>
+                </a:solidFill>
+                <a:latin typeface="Tahoma"/>
+                <a:ea typeface="メイリオ"/>
+                <a:cs typeface="Tahoma"/>
+              </a:rPr>
+              <a:t>Pass again is consisted of alphabets and numbers. The minimum length is 6.</a:t>
+            </a:r>
+          </a:p>
+        </p:txBody>
+      </p:sp>
+      <p:sp>
+        <p:nvSpPr>
+          <p:cNvPr id="39" name="TextBox 38"/>
+          <p:cNvSpPr txBox="1"/>
+          <p:nvPr/>
+        </p:nvSpPr>
+        <p:spPr>
+          <a:xfrm>
+            <a:off x="4308877" y="2688745"/>
+            <a:ext cx="2346085" cy="357489"/>
+          </a:xfrm>
+          <a:prstGeom prst="rect">
+            <a:avLst/>
+          </a:prstGeom>
+          <a:noFill/>
+        </p:spPr>
+        <p:txBody>
+          <a:bodyPr wrap="square" lIns="140671" tIns="70336" rIns="140671" bIns="70336" rtlCol="0">
+            <a:spAutoFit/>
+          </a:bodyPr>
+          <a:lstStyle/>
+          <a:p>
+            <a:r>
+              <a:rPr lang="en-US" sz="1400" dirty="0" smtClean="0"/>
+              <a:t>Note:</a:t>
+            </a:r>
+            <a:endParaRPr lang="en-US" sz="1400" dirty="0"/>
+          </a:p>
+        </p:txBody>
+      </p:sp>
+      <p:sp>
+        <p:nvSpPr>
+          <p:cNvPr id="41" name="テキスト ボックス 89"/>
+          <p:cNvSpPr txBox="1"/>
+          <p:nvPr/>
+        </p:nvSpPr>
+        <p:spPr>
+          <a:xfrm>
+            <a:off x="94550" y="449141"/>
+            <a:ext cx="1635346" cy="357489"/>
+          </a:xfrm>
+          <a:prstGeom prst="rect">
+            <a:avLst/>
+          </a:prstGeom>
+          <a:noFill/>
+        </p:spPr>
+        <p:txBody>
+          <a:bodyPr wrap="none" lIns="140671" tIns="70336" rIns="140671" bIns="70336" rtlCol="0">
+            <a:spAutoFit/>
+          </a:bodyPr>
+          <a:lstStyle/>
+          <a:p>
+            <a:r>
+              <a:rPr kumimoji="1" lang="en-US" altLang="ja-JP" sz="1400" b="1" dirty="0">
+                <a:latin typeface="メイリオ"/>
+                <a:ea typeface="メイリオ"/>
+                <a:cs typeface="メイリオ"/>
+              </a:rPr>
+              <a:t>Screen Layout</a:t>
+            </a:r>
+            <a:endParaRPr kumimoji="1" lang="ja-JP" altLang="en-US" sz="1400" b="1" dirty="0">
+              <a:latin typeface="メイリオ"/>
+              <a:ea typeface="メイリオ"/>
+              <a:cs typeface="メイリオ"/>
+            </a:endParaRPr>
+          </a:p>
+        </p:txBody>
+      </p:sp>
+      <p:graphicFrame>
+        <p:nvGraphicFramePr>
+          <p:cNvPr id="43" name="表 8"/>
+          <p:cNvGraphicFramePr>
+            <a:graphicFrameLocks noGrp="1"/>
+          </p:cNvGraphicFramePr>
+          <p:nvPr>
+            <p:extLst>
+              <p:ext uri="{D42A27DB-BD31-4B8C-83A1-F6EECF244321}">
+                <p14:modId xmlns:p14="http://schemas.microsoft.com/office/powerpoint/2010/main" val="1676215403"/>
+              </p:ext>
+            </p:extLst>
+          </p:nvPr>
+        </p:nvGraphicFramePr>
+        <p:xfrm>
+          <a:off x="62245" y="5364481"/>
+          <a:ext cx="6592717" cy="3037607"/>
+        </p:xfrm>
+        <a:graphic>
+          <a:graphicData uri="http://schemas.openxmlformats.org/drawingml/2006/table">
+            <a:tbl>
+              <a:tblPr firstRow="1" bandRow="1">
+                <a:tableStyleId>{69012ECD-51FC-41F1-AA8D-1B2483CD663E}</a:tableStyleId>
+              </a:tblPr>
+              <a:tblGrid>
+                <a:gridCol w="376445"/>
+                <a:gridCol w="1359520"/>
+                <a:gridCol w="4856752"/>
+              </a:tblGrid>
+              <a:tr h="327077">
+                <a:tc>
+                  <a:txBody>
+                    <a:bodyPr/>
+                    <a:lstStyle/>
+                    <a:p>
+                      <a:pPr algn="ctr"/>
+                      <a:r>
+                        <a:rPr kumimoji="1" lang="en-US" altLang="ja-JP" sz="1000" dirty="0" smtClean="0"/>
+                        <a:t>No</a:t>
+                      </a:r>
+                      <a:endParaRPr kumimoji="1" lang="ja-JP" altLang="en-US" sz="1000" b="0" dirty="0">
+                        <a:solidFill>
+                          <a:schemeClr val="tx1"/>
+                        </a:solidFill>
+                      </a:endParaRPr>
+                    </a:p>
+                  </a:txBody>
+                  <a:tcPr marL="104503" marR="104503" anchor="ctr"/>
+                </a:tc>
+                <a:tc>
+                  <a:txBody>
+                    <a:bodyPr/>
+                    <a:lstStyle/>
+                    <a:p>
+                      <a:pPr algn="ctr"/>
+                      <a:r>
+                        <a:rPr kumimoji="1" lang="en-US" altLang="ja-JP" sz="1000" dirty="0" smtClean="0"/>
+                        <a:t>Control</a:t>
+                      </a:r>
+                      <a:r>
+                        <a:rPr kumimoji="1" lang="en-US" altLang="ja-JP" sz="1000" baseline="0" dirty="0" smtClean="0"/>
+                        <a:t> </a:t>
+                      </a:r>
+                      <a:r>
+                        <a:rPr kumimoji="1" lang="en-US" altLang="ja-JP" sz="1000" dirty="0" smtClean="0"/>
+                        <a:t>Name</a:t>
+                      </a:r>
+                      <a:endParaRPr kumimoji="1" lang="ja-JP" altLang="en-US" sz="1000" b="0" dirty="0">
+                        <a:solidFill>
+                          <a:schemeClr val="tx1"/>
+                        </a:solidFill>
+                      </a:endParaRPr>
+                    </a:p>
+                  </a:txBody>
+                  <a:tcPr marL="104503" marR="104503" anchor="ctr"/>
+                </a:tc>
+                <a:tc>
+                  <a:txBody>
+                    <a:bodyPr/>
+                    <a:lstStyle/>
+                    <a:p>
+                      <a:pPr algn="ctr"/>
+                      <a:r>
+                        <a:rPr kumimoji="1" lang="en-US" altLang="ja-JP" sz="1000" dirty="0" smtClean="0"/>
+                        <a:t>Outline</a:t>
+                      </a:r>
+                      <a:r>
+                        <a:rPr kumimoji="1" lang="en-US" altLang="ja-JP" sz="1000" baseline="0" dirty="0" smtClean="0"/>
+                        <a:t> of processing</a:t>
+                      </a:r>
+                      <a:endParaRPr kumimoji="1" lang="ja-JP" altLang="en-US" sz="1000" b="0" dirty="0">
+                        <a:solidFill>
+                          <a:schemeClr val="tx1"/>
+                        </a:solidFill>
+                      </a:endParaRPr>
+                    </a:p>
+                  </a:txBody>
+                  <a:tcPr marL="104503" marR="104503" anchor="ctr"/>
+                </a:tc>
+              </a:tr>
+              <a:tr h="327077">
+                <a:tc>
+                  <a:txBody>
+                    <a:bodyPr/>
+                    <a:lstStyle/>
+                    <a:p>
+                      <a:pPr algn="ctr"/>
+                      <a:r>
+                        <a:rPr kumimoji="1" lang="en-US" altLang="ja-JP" sz="1000" dirty="0" smtClean="0"/>
+                        <a:t>#1</a:t>
+                      </a:r>
+                      <a:endParaRPr kumimoji="1" lang="ja-JP" altLang="en-US" sz="1000" b="0" dirty="0"/>
+                    </a:p>
+                  </a:txBody>
+                  <a:tcPr marL="104503" marR="104503" anchor="ctr"/>
+                </a:tc>
+                <a:tc>
+                  <a:txBody>
+                    <a:bodyPr/>
+                    <a:lstStyle/>
+                    <a:p>
+                      <a:r>
+                        <a:rPr kumimoji="1" lang="en-US" altLang="ja-JP" sz="1000" b="0" dirty="0" smtClean="0"/>
+                        <a:t>Old</a:t>
+                      </a:r>
+                      <a:r>
+                        <a:rPr kumimoji="1" lang="en-US" altLang="ja-JP" sz="1000" b="0" baseline="0" dirty="0" smtClean="0"/>
+                        <a:t> Pass</a:t>
+                      </a:r>
+                      <a:endParaRPr kumimoji="1" lang="ja-JP" altLang="en-US" sz="1000" b="0" dirty="0"/>
+                    </a:p>
+                  </a:txBody>
+                  <a:tcPr marL="104503" marR="104503" anchor="ctr"/>
+                </a:tc>
+                <a:tc>
+                  <a:txBody>
+                    <a:bodyPr/>
+                    <a:lstStyle/>
+                    <a:p>
+                      <a:r>
+                        <a:rPr kumimoji="1" lang="en-US" altLang="ja-JP" sz="1000" baseline="0" dirty="0" smtClean="0"/>
+                        <a:t>Put the user’s old password here.</a:t>
+                      </a:r>
+                      <a:endParaRPr kumimoji="1" lang="ja-JP" altLang="en-US" sz="1000" b="0" dirty="0"/>
+                    </a:p>
+                  </a:txBody>
+                  <a:tcPr marL="104503" marR="104503"/>
+                </a:tc>
+              </a:tr>
+              <a:tr h="327077">
+                <a:tc>
+                  <a:txBody>
+                    <a:bodyPr/>
+                    <a:lstStyle/>
+                    <a:p>
+                      <a:pPr algn="ctr"/>
+                      <a:r>
+                        <a:rPr kumimoji="1" lang="en-US" altLang="ja-JP" sz="1000" dirty="0" smtClean="0"/>
+                        <a:t>#2</a:t>
+                      </a:r>
+                      <a:endParaRPr kumimoji="1" lang="ja-JP" altLang="en-US" sz="1000" b="0" dirty="0"/>
+                    </a:p>
+                  </a:txBody>
+                  <a:tcPr marL="104503" marR="104503" anchor="ctr"/>
+                </a:tc>
+                <a:tc>
+                  <a:txBody>
+                    <a:bodyPr/>
+                    <a:lstStyle/>
+                    <a:p>
+                      <a:r>
+                        <a:rPr kumimoji="1" lang="en-US" altLang="ja-JP" sz="1000" dirty="0" smtClean="0"/>
+                        <a:t>New</a:t>
+                      </a:r>
+                      <a:r>
+                        <a:rPr kumimoji="1" lang="en-US" altLang="ja-JP" sz="1000" baseline="0" dirty="0" smtClean="0"/>
+                        <a:t> </a:t>
+                      </a:r>
+                      <a:r>
+                        <a:rPr kumimoji="1" lang="en-US" altLang="ja-JP" sz="1000" dirty="0" smtClean="0"/>
+                        <a:t>password</a:t>
+                      </a:r>
+                      <a:endParaRPr kumimoji="1" lang="ja-JP" altLang="en-US" sz="1000" b="0" dirty="0"/>
+                    </a:p>
+                  </a:txBody>
+                  <a:tcPr marL="104503" marR="104503" anchor="ctr"/>
+                </a:tc>
+                <a:tc>
+                  <a:txBody>
+                    <a:bodyPr/>
+                    <a:lstStyle/>
+                    <a:p>
+                      <a:r>
+                        <a:rPr kumimoji="1" lang="en-US" altLang="ja-JP" sz="1000" dirty="0" smtClean="0"/>
+                        <a:t>Put the user’s </a:t>
+                      </a:r>
+                      <a:r>
+                        <a:rPr kumimoji="1" lang="en-US" altLang="ja-JP" sz="1000" dirty="0" smtClean="0"/>
+                        <a:t>new password </a:t>
+                      </a:r>
+                      <a:r>
+                        <a:rPr kumimoji="1" lang="en-US" altLang="ja-JP" sz="1000" dirty="0" smtClean="0"/>
+                        <a:t>in here.</a:t>
+                      </a:r>
+                      <a:endParaRPr kumimoji="1" lang="ja-JP" altLang="en-US" sz="1000" b="0" dirty="0"/>
+                    </a:p>
+                  </a:txBody>
+                  <a:tcPr marL="104503" marR="104503"/>
+                </a:tc>
+              </a:tr>
+              <a:tr h="327077">
+                <a:tc>
+                  <a:txBody>
+                    <a:bodyPr/>
+                    <a:lstStyle/>
+                    <a:p>
+                      <a:pPr algn="ctr"/>
+                      <a:r>
+                        <a:rPr kumimoji="1" lang="en-US" altLang="ja-JP" sz="1000" b="0" dirty="0"/>
+                        <a:t>#3</a:t>
+                      </a:r>
+                      <a:endParaRPr kumimoji="1" lang="ja-JP" altLang="en-US" sz="1000" b="0" dirty="0"/>
+                    </a:p>
+                  </a:txBody>
+                  <a:tcPr marL="104503" marR="104503" anchor="ctr"/>
+                </a:tc>
+                <a:tc>
+                  <a:txBody>
+                    <a:bodyPr/>
+                    <a:lstStyle/>
+                    <a:p>
+                      <a:pPr marL="0" marR="0" indent="0" algn="l" defTabSz="457200" rtl="0" eaLnBrk="1" fontAlgn="auto" latinLnBrk="0" hangingPunct="1">
+                        <a:lnSpc>
+                          <a:spcPct val="100000"/>
+                        </a:lnSpc>
+                        <a:spcBef>
+                          <a:spcPts val="0"/>
+                        </a:spcBef>
+                        <a:spcAft>
+                          <a:spcPts val="0"/>
+                        </a:spcAft>
+                        <a:buClrTx/>
+                        <a:buSzTx/>
+                        <a:buFontTx/>
+                        <a:buNone/>
+                        <a:tabLst/>
+                        <a:defRPr/>
+                      </a:pPr>
+                      <a:r>
+                        <a:rPr kumimoji="1" lang="en-US" altLang="ja-JP" sz="1000" dirty="0" smtClean="0"/>
+                        <a:t>User password again</a:t>
+                      </a:r>
+                      <a:endParaRPr kumimoji="1" lang="ja-JP" altLang="en-US" sz="1000" b="0" dirty="0"/>
+                    </a:p>
+                  </a:txBody>
+                  <a:tcPr marL="104503" marR="104503" anchor="ctr"/>
+                </a:tc>
+                <a:tc>
+                  <a:txBody>
+                    <a:bodyPr/>
+                    <a:lstStyle/>
+                    <a:p>
+                      <a:pPr marL="0" marR="0" indent="0" algn="l" defTabSz="457200" rtl="0" eaLnBrk="1" fontAlgn="auto" latinLnBrk="0" hangingPunct="1">
+                        <a:lnSpc>
+                          <a:spcPct val="100000"/>
+                        </a:lnSpc>
+                        <a:spcBef>
+                          <a:spcPts val="0"/>
+                        </a:spcBef>
+                        <a:spcAft>
+                          <a:spcPts val="0"/>
+                        </a:spcAft>
+                        <a:buClrTx/>
+                        <a:buSzTx/>
+                        <a:buFontTx/>
+                        <a:buNone/>
+                        <a:tabLst/>
+                        <a:defRPr/>
+                      </a:pPr>
+                      <a:r>
+                        <a:rPr kumimoji="1" lang="en-US" altLang="ja-JP" sz="1000" dirty="0" smtClean="0"/>
+                        <a:t>Put the user’s </a:t>
+                      </a:r>
+                      <a:r>
+                        <a:rPr kumimoji="1" lang="en-US" altLang="ja-JP" sz="1000" dirty="0" smtClean="0"/>
+                        <a:t>new password </a:t>
+                      </a:r>
+                      <a:r>
+                        <a:rPr kumimoji="1" lang="en-US" altLang="ja-JP" sz="1000" dirty="0" smtClean="0"/>
+                        <a:t>again  here.</a:t>
+                      </a:r>
+                      <a:endParaRPr kumimoji="1" lang="ja-JP" altLang="en-US" sz="1000" b="0" dirty="0"/>
+                    </a:p>
+                  </a:txBody>
+                  <a:tcPr marL="104503" marR="104503"/>
+                </a:tc>
+              </a:tr>
+              <a:tr h="531501">
+                <a:tc>
+                  <a:txBody>
+                    <a:bodyPr/>
+                    <a:lstStyle/>
+                    <a:p>
+                      <a:pPr algn="ctr"/>
+                      <a:r>
+                        <a:rPr kumimoji="1" lang="en-US" altLang="ja-JP" sz="1000" dirty="0" smtClean="0"/>
+                        <a:t>#4</a:t>
+                      </a:r>
+                      <a:endParaRPr kumimoji="1" lang="ja-JP" altLang="en-US" sz="1000" b="0" dirty="0"/>
+                    </a:p>
+                  </a:txBody>
+                  <a:tcPr marL="104503" marR="104503" anchor="ctr"/>
+                </a:tc>
+                <a:tc>
+                  <a:txBody>
+                    <a:bodyPr/>
+                    <a:lstStyle/>
+                    <a:p>
+                      <a:r>
+                        <a:rPr kumimoji="1" lang="en-US" altLang="ja-JP" sz="1000" dirty="0" smtClean="0"/>
+                        <a:t>Cancel button</a:t>
+                      </a:r>
+                      <a:endParaRPr kumimoji="1" lang="ja-JP" altLang="en-US" sz="1000" b="0" dirty="0"/>
+                    </a:p>
+                  </a:txBody>
+                  <a:tcPr marL="104503" marR="104503" anchor="ctr"/>
+                </a:tc>
+                <a:tc>
+                  <a:txBody>
+                    <a:bodyPr/>
+                    <a:lstStyle/>
+                    <a:p>
+                      <a:r>
+                        <a:rPr kumimoji="1" lang="en-US" altLang="ja-JP" sz="1000" dirty="0" smtClean="0"/>
+                        <a:t>When user</a:t>
+                      </a:r>
+                      <a:r>
+                        <a:rPr kumimoji="1" lang="en-US" altLang="ja-JP" sz="1000" baseline="0" dirty="0" smtClean="0"/>
+                        <a:t> want cancel </a:t>
+                      </a:r>
+                      <a:r>
+                        <a:rPr kumimoji="1" lang="en-US" altLang="ja-JP" sz="1000" baseline="0" dirty="0" smtClean="0"/>
+                        <a:t>Update new password, </a:t>
+                      </a:r>
+                      <a:r>
+                        <a:rPr kumimoji="1" lang="en-US" altLang="ja-JP" sz="1000" baseline="0" dirty="0" smtClean="0"/>
+                        <a:t>click here. </a:t>
+                      </a:r>
+                      <a:endParaRPr kumimoji="1" lang="ja-JP" altLang="en-US" sz="1000" b="0" dirty="0"/>
+                    </a:p>
+                  </a:txBody>
+                  <a:tcPr marL="104503" marR="104503"/>
+                </a:tc>
+              </a:tr>
+              <a:tr h="532544">
+                <a:tc>
+                  <a:txBody>
+                    <a:bodyPr/>
+                    <a:lstStyle/>
+                    <a:p>
+                      <a:pPr algn="ctr"/>
+                      <a:r>
+                        <a:rPr kumimoji="1" lang="en-US" altLang="ja-JP" sz="1000" b="0" dirty="0" smtClean="0"/>
+                        <a:t>#5</a:t>
+                      </a:r>
+                      <a:endParaRPr kumimoji="1" lang="ja-JP" altLang="en-US" sz="1000" b="0" dirty="0"/>
+                    </a:p>
+                  </a:txBody>
+                  <a:tcPr marL="104503" marR="104503" anchor="ctr"/>
+                </a:tc>
+                <a:tc>
+                  <a:txBody>
+                    <a:bodyPr/>
+                    <a:lstStyle/>
+                    <a:p>
+                      <a:r>
+                        <a:rPr kumimoji="1" lang="en-US" altLang="ja-JP" sz="1000" baseline="0" dirty="0" smtClean="0"/>
+                        <a:t>Update </a:t>
+                      </a:r>
+                      <a:r>
+                        <a:rPr kumimoji="1" lang="en-US" altLang="ja-JP" sz="1000" dirty="0" smtClean="0"/>
+                        <a:t>button</a:t>
+                      </a:r>
+                      <a:endParaRPr kumimoji="1" lang="ja-JP" altLang="en-US" sz="1000" b="0" dirty="0"/>
+                    </a:p>
+                  </a:txBody>
+                  <a:tcPr marL="104503" marR="104503" anchor="ctr"/>
+                </a:tc>
+                <a:tc>
+                  <a:txBody>
+                    <a:bodyPr/>
+                    <a:lstStyle/>
+                    <a:p>
+                      <a:pPr marL="0" marR="0" indent="0" algn="l" defTabSz="703356" rtl="0" eaLnBrk="1" fontAlgn="auto" latinLnBrk="0" hangingPunct="1">
+                        <a:lnSpc>
+                          <a:spcPct val="100000"/>
+                        </a:lnSpc>
+                        <a:spcBef>
+                          <a:spcPts val="0"/>
+                        </a:spcBef>
+                        <a:spcAft>
+                          <a:spcPts val="0"/>
+                        </a:spcAft>
+                        <a:buClrTx/>
+                        <a:buSzTx/>
+                        <a:buFontTx/>
+                        <a:buNone/>
+                        <a:tabLst/>
+                        <a:defRPr/>
+                      </a:pPr>
+                      <a:r>
+                        <a:rPr kumimoji="1" lang="en-US" altLang="ja-JP" sz="1000" dirty="0" smtClean="0"/>
+                        <a:t>When the button is pressed, the </a:t>
+                      </a:r>
+                      <a:r>
+                        <a:rPr kumimoji="1" lang="en-US" altLang="ja-JP" sz="1000" dirty="0" smtClean="0"/>
+                        <a:t>old</a:t>
+                      </a:r>
+                      <a:r>
+                        <a:rPr kumimoji="1" lang="en-US" altLang="ja-JP" sz="1000" baseline="0" dirty="0" smtClean="0"/>
+                        <a:t> password </a:t>
+                      </a:r>
+                      <a:r>
+                        <a:rPr kumimoji="1" lang="en-US" altLang="ja-JP" sz="1000" dirty="0" smtClean="0"/>
+                        <a:t>and password, password again </a:t>
+                      </a:r>
+                      <a:r>
+                        <a:rPr kumimoji="1" lang="en-US" altLang="ja-JP" sz="1000" dirty="0" smtClean="0"/>
+                        <a:t>are checked with case #7 and #8. If it’s correct, move to the 004</a:t>
+                      </a:r>
+                      <a:r>
+                        <a:rPr kumimoji="1" lang="en-US" altLang="ja-JP" sz="1000" baseline="0" dirty="0" smtClean="0"/>
+                        <a:t> </a:t>
+                      </a:r>
+                      <a:r>
+                        <a:rPr kumimoji="1" lang="en-US" altLang="ja-JP" sz="1000" dirty="0" smtClean="0"/>
+                        <a:t>screen. If it’s failed, show popup error message ( error screen </a:t>
+                      </a:r>
+                      <a:r>
+                        <a:rPr kumimoji="1" lang="en-US" altLang="ja-JP" sz="1000" dirty="0" smtClean="0"/>
+                        <a:t>)</a:t>
+                      </a:r>
+                      <a:endParaRPr kumimoji="1" lang="en-US" altLang="ja-JP" sz="1000" b="0" dirty="0" smtClean="0"/>
+                    </a:p>
+                  </a:txBody>
+                  <a:tcPr marL="104503" marR="104503"/>
+                </a:tc>
+              </a:tr>
+              <a:tr h="324579">
+                <a:tc>
+                  <a:txBody>
+                    <a:bodyPr/>
+                    <a:lstStyle/>
+                    <a:p>
+                      <a:pPr algn="ctr"/>
+                      <a:r>
+                        <a:rPr kumimoji="1" lang="en-US" altLang="ja-JP" sz="1000" b="0" dirty="0" smtClean="0"/>
+                        <a:t>#6</a:t>
+                      </a:r>
+                      <a:endParaRPr kumimoji="1" lang="ja-JP" altLang="en-US" sz="1000" b="0" dirty="0"/>
+                    </a:p>
+                  </a:txBody>
+                  <a:tcPr marL="104503" marR="104503" anchor="ctr"/>
+                </a:tc>
+                <a:tc>
+                  <a:txBody>
+                    <a:bodyPr/>
+                    <a:lstStyle/>
+                    <a:p>
+                      <a:pPr marL="0" marR="0" indent="0" algn="l" defTabSz="703356" rtl="0" eaLnBrk="1" fontAlgn="auto" latinLnBrk="0" hangingPunct="1">
+                        <a:lnSpc>
+                          <a:spcPct val="100000"/>
+                        </a:lnSpc>
+                        <a:spcBef>
+                          <a:spcPts val="0"/>
+                        </a:spcBef>
+                        <a:spcAft>
+                          <a:spcPts val="0"/>
+                        </a:spcAft>
+                        <a:buClrTx/>
+                        <a:buSzTx/>
+                        <a:buFontTx/>
+                        <a:buNone/>
+                        <a:tabLst/>
+                        <a:defRPr/>
+                      </a:pPr>
+                      <a:r>
+                        <a:rPr kumimoji="1" lang="en-US" altLang="ja-JP" sz="1000" b="0" dirty="0" smtClean="0"/>
+                        <a:t>Error</a:t>
+                      </a:r>
+                      <a:endParaRPr kumimoji="1" lang="ja-JP" altLang="en-US" sz="1000" b="0" dirty="0" smtClean="0"/>
+                    </a:p>
+                  </a:txBody>
+                  <a:tcPr marL="104503" marR="104503" anchor="ctr"/>
+                </a:tc>
+                <a:tc>
+                  <a:txBody>
+                    <a:bodyPr/>
+                    <a:lstStyle/>
+                    <a:p>
+                      <a:pPr marL="0" marR="0" indent="0" algn="l" defTabSz="703356" rtl="0" eaLnBrk="1" fontAlgn="auto" latinLnBrk="0" hangingPunct="1">
+                        <a:lnSpc>
+                          <a:spcPct val="100000"/>
+                        </a:lnSpc>
+                        <a:spcBef>
+                          <a:spcPts val="0"/>
+                        </a:spcBef>
+                        <a:spcAft>
+                          <a:spcPts val="0"/>
+                        </a:spcAft>
+                        <a:buClrTx/>
+                        <a:buSzTx/>
+                        <a:buFontTx/>
+                        <a:buNone/>
+                        <a:tabLst/>
+                        <a:defRPr/>
+                      </a:pPr>
+                      <a:r>
+                        <a:rPr kumimoji="1" lang="en-US" altLang="ja-JP" sz="1000" b="0" dirty="0" smtClean="0"/>
+                        <a:t>Show the error is sent to Server</a:t>
+                      </a:r>
+                      <a:endParaRPr kumimoji="1" lang="ja-JP" altLang="en-US" sz="1000" b="0" dirty="0" smtClean="0"/>
+                    </a:p>
+                  </a:txBody>
+                  <a:tcPr marL="104503" marR="104503"/>
+                </a:tc>
+              </a:tr>
+              <a:tr h="324579">
+                <a:tc>
+                  <a:txBody>
+                    <a:bodyPr/>
+                    <a:lstStyle/>
+                    <a:p>
+                      <a:pPr algn="ctr"/>
+                      <a:r>
+                        <a:rPr kumimoji="1" lang="en-US" altLang="ja-JP" sz="1000" b="0" smtClean="0"/>
+                        <a:t>#7</a:t>
+                      </a:r>
+                      <a:endParaRPr kumimoji="1" lang="ja-JP" altLang="en-US" sz="1000" b="0" dirty="0"/>
+                    </a:p>
+                  </a:txBody>
+                  <a:tcPr marL="104503" marR="104503" anchor="ctr"/>
+                </a:tc>
+                <a:tc>
+                  <a:txBody>
+                    <a:bodyPr/>
+                    <a:lstStyle/>
+                    <a:p>
+                      <a:pPr marL="0" marR="0" indent="0" algn="l" defTabSz="703356" rtl="0" eaLnBrk="1" fontAlgn="auto" latinLnBrk="0" hangingPunct="1">
+                        <a:lnSpc>
+                          <a:spcPct val="100000"/>
+                        </a:lnSpc>
+                        <a:spcBef>
+                          <a:spcPts val="0"/>
+                        </a:spcBef>
+                        <a:spcAft>
+                          <a:spcPts val="0"/>
+                        </a:spcAft>
+                        <a:buClrTx/>
+                        <a:buSzTx/>
+                        <a:buFontTx/>
+                        <a:buNone/>
+                        <a:tabLst/>
+                        <a:defRPr/>
+                      </a:pPr>
+                      <a:r>
+                        <a:rPr kumimoji="1" lang="en-US" altLang="ja-JP" sz="1000" b="0" dirty="0" smtClean="0"/>
+                        <a:t>Error</a:t>
+                      </a:r>
+                      <a:endParaRPr kumimoji="1" lang="ja-JP" altLang="en-US" sz="1000" b="0" dirty="0" smtClean="0"/>
+                    </a:p>
+                  </a:txBody>
+                  <a:tcPr marL="104503" marR="104503" anchor="ctr"/>
+                </a:tc>
+                <a:tc>
+                  <a:txBody>
+                    <a:bodyPr/>
+                    <a:lstStyle/>
+                    <a:p>
+                      <a:pPr marL="0" marR="0" indent="0" algn="l" defTabSz="703356" rtl="0" eaLnBrk="1" fontAlgn="auto" latinLnBrk="0" hangingPunct="1">
+                        <a:lnSpc>
+                          <a:spcPct val="100000"/>
+                        </a:lnSpc>
+                        <a:spcBef>
+                          <a:spcPts val="0"/>
+                        </a:spcBef>
+                        <a:spcAft>
+                          <a:spcPts val="0"/>
+                        </a:spcAft>
+                        <a:buClrTx/>
+                        <a:buSzTx/>
+                        <a:buFontTx/>
+                        <a:buNone/>
+                        <a:tabLst/>
+                        <a:defRPr/>
+                      </a:pPr>
+                      <a:r>
+                        <a:rPr kumimoji="1" lang="en-US" altLang="ja-JP" sz="1000" b="0" dirty="0" smtClean="0"/>
+                        <a:t>Show the error is sent to Server</a:t>
+                      </a:r>
+                      <a:endParaRPr kumimoji="1" lang="ja-JP" altLang="en-US" sz="1000" b="0" dirty="0" smtClean="0"/>
+                    </a:p>
+                  </a:txBody>
+                  <a:tcPr marL="104503" marR="104503"/>
+                </a:tc>
+              </a:tr>
+            </a:tbl>
+          </a:graphicData>
+        </a:graphic>
+      </p:graphicFrame>
+      <p:grpSp>
+        <p:nvGrpSpPr>
+          <p:cNvPr id="44" name="Group 43"/>
+          <p:cNvGrpSpPr/>
+          <p:nvPr/>
+        </p:nvGrpSpPr>
+        <p:grpSpPr>
+          <a:xfrm>
+            <a:off x="0" y="0"/>
+            <a:ext cx="6858000" cy="395076"/>
+            <a:chOff x="-13160" y="0"/>
+            <a:chExt cx="9164506" cy="295929"/>
+          </a:xfrm>
+          <a:solidFill>
+            <a:srgbClr val="FFFFFF"/>
+          </a:solidFill>
+        </p:grpSpPr>
+        <p:sp>
+          <p:nvSpPr>
+            <p:cNvPr id="45" name="Rectangle 44"/>
+            <p:cNvSpPr/>
+            <p:nvPr/>
+          </p:nvSpPr>
+          <p:spPr>
+            <a:xfrm>
+              <a:off x="-13160" y="0"/>
+              <a:ext cx="7656732" cy="295929"/>
+            </a:xfrm>
+            <a:prstGeom prst="rect">
+              <a:avLst/>
+            </a:prstGeom>
+            <a:grpFill/>
+            <a:ln>
+              <a:solidFill>
+                <a:srgbClr val="000000"/>
+              </a:solidFill>
+            </a:ln>
+            <a:effectLst/>
+          </p:spPr>
+          <p:style>
+            <a:lnRef idx="0">
+              <a:schemeClr val="accent1"/>
+            </a:lnRef>
+            <a:fillRef idx="3">
+              <a:schemeClr val="accent1"/>
+            </a:fillRef>
+            <a:effectRef idx="3">
+              <a:schemeClr val="accent1"/>
+            </a:effectRef>
+            <a:fontRef idx="minor">
+              <a:schemeClr val="lt1"/>
+            </a:fontRef>
+          </p:style>
+          <p:txBody>
+            <a:bodyPr rtlCol="0" anchor="ctr"/>
+            <a:lstStyle/>
+            <a:p>
+              <a:r>
+                <a:rPr lang="en-US" sz="1800" dirty="0" smtClean="0">
+                  <a:solidFill>
+                    <a:srgbClr val="000000"/>
+                  </a:solidFill>
+                </a:rPr>
+                <a:t>Regedit</a:t>
+              </a:r>
+              <a:endParaRPr lang="en-US" sz="1800" dirty="0">
+                <a:solidFill>
+                  <a:srgbClr val="000000"/>
+                </a:solidFill>
+              </a:endParaRPr>
+            </a:p>
+          </p:txBody>
+        </p:sp>
+        <p:sp>
+          <p:nvSpPr>
+            <p:cNvPr id="46" name="Rectangle 45"/>
+            <p:cNvSpPr/>
+            <p:nvPr/>
+          </p:nvSpPr>
+          <p:spPr>
+            <a:xfrm>
+              <a:off x="7692892" y="0"/>
+              <a:ext cx="1458454" cy="295929"/>
+            </a:xfrm>
+            <a:prstGeom prst="rect">
+              <a:avLst/>
+            </a:prstGeom>
+            <a:grpFill/>
+            <a:ln>
+              <a:solidFill>
+                <a:srgbClr val="000000"/>
+              </a:solidFill>
+            </a:ln>
+            <a:effectLst/>
+          </p:spPr>
+          <p:style>
+            <a:lnRef idx="1">
+              <a:schemeClr val="accent3"/>
+            </a:lnRef>
+            <a:fillRef idx="3">
+              <a:schemeClr val="accent3"/>
+            </a:fillRef>
+            <a:effectRef idx="2">
+              <a:schemeClr val="accent3"/>
+            </a:effectRef>
+            <a:fontRef idx="minor">
+              <a:schemeClr val="lt1"/>
+            </a:fontRef>
+          </p:style>
+          <p:txBody>
+            <a:bodyPr rtlCol="0" anchor="ctr"/>
+            <a:lstStyle/>
+            <a:p>
+              <a:r>
+                <a:rPr lang="en-US" dirty="0" smtClean="0">
+                  <a:solidFill>
+                    <a:srgbClr val="000000"/>
+                  </a:solidFill>
+                </a:rPr>
+                <a:t>ID:003</a:t>
+              </a:r>
+              <a:endParaRPr lang="en-US" sz="1800" dirty="0">
+                <a:solidFill>
+                  <a:srgbClr val="000000"/>
+                </a:solidFill>
+              </a:endParaRPr>
+            </a:p>
+          </p:txBody>
+        </p:sp>
+      </p:grpSp>
+      <p:grpSp>
+        <p:nvGrpSpPr>
+          <p:cNvPr id="17" name="Group 16"/>
+          <p:cNvGrpSpPr/>
+          <p:nvPr/>
+        </p:nvGrpSpPr>
+        <p:grpSpPr>
+          <a:xfrm>
+            <a:off x="1058640" y="4075304"/>
+            <a:ext cx="2273130" cy="1100100"/>
+            <a:chOff x="2286943" y="3764000"/>
+            <a:chExt cx="2273130" cy="1100100"/>
+          </a:xfrm>
+        </p:grpSpPr>
+        <p:sp>
+          <p:nvSpPr>
+            <p:cNvPr id="2" name="Rounded Rectangle 1"/>
+            <p:cNvSpPr/>
+            <p:nvPr/>
+          </p:nvSpPr>
+          <p:spPr>
+            <a:xfrm>
+              <a:off x="2286943" y="3764000"/>
+              <a:ext cx="2246957" cy="1100100"/>
+            </a:xfrm>
+            <a:prstGeom prst="roundRect">
+              <a:avLst/>
+            </a:prstGeom>
+            <a:solidFill>
+              <a:schemeClr val="tx2">
+                <a:lumMod val="40000"/>
+                <a:lumOff val="60000"/>
+              </a:schemeClr>
+            </a:solidFill>
+          </p:spPr>
+          <p:style>
+            <a:lnRef idx="1">
+              <a:schemeClr val="accent1"/>
+            </a:lnRef>
+            <a:fillRef idx="3">
+              <a:schemeClr val="accent1"/>
+            </a:fillRef>
+            <a:effectRef idx="2">
+              <a:schemeClr val="accent1"/>
+            </a:effectRef>
+            <a:fontRef idx="minor">
+              <a:schemeClr val="lt1"/>
+            </a:fontRef>
+          </p:style>
+          <p:txBody>
+            <a:bodyPr rtlCol="0" anchor="ctr"/>
+            <a:lstStyle/>
+            <a:p>
+              <a:pPr algn="ctr"/>
+              <a:endParaRPr lang="en-US" dirty="0"/>
+            </a:p>
+          </p:txBody>
+        </p:sp>
+        <p:sp>
+          <p:nvSpPr>
+            <p:cNvPr id="3" name="TextBox 2"/>
+            <p:cNvSpPr txBox="1"/>
+            <p:nvPr/>
+          </p:nvSpPr>
+          <p:spPr>
+            <a:xfrm>
+              <a:off x="2408842" y="3910194"/>
+              <a:ext cx="1998057" cy="630942"/>
+            </a:xfrm>
+            <a:prstGeom prst="rect">
+              <a:avLst/>
+            </a:prstGeom>
+            <a:noFill/>
+          </p:spPr>
+          <p:txBody>
+            <a:bodyPr wrap="square" rtlCol="0">
+              <a:spAutoFit/>
+            </a:bodyPr>
+            <a:lstStyle/>
+            <a:p>
+              <a:pPr algn="ctr"/>
+              <a:r>
+                <a:rPr lang="en-US" sz="1100" dirty="0" smtClean="0"/>
+                <a:t>ERROR</a:t>
+              </a:r>
+            </a:p>
+            <a:p>
+              <a:pPr algn="ctr"/>
+              <a:r>
+                <a:rPr lang="en-US" sz="1200" dirty="0" smtClean="0"/>
+                <a:t>New Pass </a:t>
+              </a:r>
+              <a:r>
+                <a:rPr lang="en-US" sz="1200" dirty="0"/>
+                <a:t>and Pass again is not match</a:t>
+              </a:r>
+            </a:p>
+          </p:txBody>
+        </p:sp>
+        <p:sp>
+          <p:nvSpPr>
+            <p:cNvPr id="10" name="Rounded Rectangle 9"/>
+            <p:cNvSpPr/>
+            <p:nvPr/>
+          </p:nvSpPr>
+          <p:spPr>
+            <a:xfrm>
+              <a:off x="2626498" y="4522915"/>
+              <a:ext cx="715684" cy="250569"/>
+            </a:xfrm>
+            <a:prstGeom prst="roundRect">
+              <a:avLst/>
+            </a:prstGeom>
+          </p:spPr>
+          <p:style>
+            <a:lnRef idx="1">
+              <a:schemeClr val="accent1"/>
+            </a:lnRef>
+            <a:fillRef idx="3">
+              <a:schemeClr val="accent1"/>
+            </a:fillRef>
+            <a:effectRef idx="2">
+              <a:schemeClr val="accent1"/>
+            </a:effectRef>
+            <a:fontRef idx="minor">
+              <a:schemeClr val="lt1"/>
+            </a:fontRef>
+          </p:style>
+          <p:txBody>
+            <a:bodyPr rtlCol="0" anchor="ctr"/>
+            <a:lstStyle/>
+            <a:p>
+              <a:pPr algn="ctr"/>
+              <a:r>
+                <a:rPr lang="en-US" sz="1000" dirty="0" smtClean="0"/>
+                <a:t>OK</a:t>
+              </a:r>
+              <a:endParaRPr lang="en-US" sz="1000" dirty="0"/>
+            </a:p>
+          </p:txBody>
+        </p:sp>
+        <p:sp>
+          <p:nvSpPr>
+            <p:cNvPr id="35" name="Rounded Rectangle 34"/>
+            <p:cNvSpPr/>
+            <p:nvPr/>
+          </p:nvSpPr>
+          <p:spPr>
+            <a:xfrm>
+              <a:off x="3543023" y="4522915"/>
+              <a:ext cx="713296" cy="250569"/>
+            </a:xfrm>
+            <a:prstGeom prst="roundRect">
+              <a:avLst/>
+            </a:prstGeom>
+          </p:spPr>
+          <p:style>
+            <a:lnRef idx="1">
+              <a:schemeClr val="accent1"/>
+            </a:lnRef>
+            <a:fillRef idx="3">
+              <a:schemeClr val="accent1"/>
+            </a:fillRef>
+            <a:effectRef idx="2">
+              <a:schemeClr val="accent1"/>
+            </a:effectRef>
+            <a:fontRef idx="minor">
+              <a:schemeClr val="lt1"/>
+            </a:fontRef>
+          </p:style>
+          <p:txBody>
+            <a:bodyPr rtlCol="0" anchor="ctr"/>
+            <a:lstStyle/>
+            <a:p>
+              <a:pPr algn="ctr"/>
+              <a:r>
+                <a:rPr lang="en-US" sz="1000" dirty="0" smtClean="0"/>
+                <a:t>CANCEL</a:t>
+              </a:r>
+              <a:endParaRPr lang="en-US" sz="1000" dirty="0"/>
+            </a:p>
+          </p:txBody>
+        </p:sp>
+        <p:sp>
+          <p:nvSpPr>
+            <p:cNvPr id="11" name="TextBox 10"/>
+            <p:cNvSpPr txBox="1"/>
+            <p:nvPr/>
+          </p:nvSpPr>
+          <p:spPr>
+            <a:xfrm>
+              <a:off x="4143448" y="3806900"/>
+              <a:ext cx="416625" cy="369332"/>
+            </a:xfrm>
+            <a:prstGeom prst="rect">
+              <a:avLst/>
+            </a:prstGeom>
+            <a:noFill/>
+          </p:spPr>
+          <p:txBody>
+            <a:bodyPr wrap="none" rtlCol="0">
+              <a:spAutoFit/>
+            </a:bodyPr>
+            <a:lstStyle/>
+            <a:p>
+              <a:r>
+                <a:rPr lang="en-US" dirty="0" smtClean="0"/>
+                <a:t>#6</a:t>
+              </a:r>
+              <a:endParaRPr lang="en-US" dirty="0"/>
+            </a:p>
+          </p:txBody>
+        </p:sp>
+      </p:grpSp>
+      <p:sp>
+        <p:nvSpPr>
+          <p:cNvPr id="40" name="TextBox 39"/>
+          <p:cNvSpPr txBox="1"/>
+          <p:nvPr/>
+        </p:nvSpPr>
+        <p:spPr>
+          <a:xfrm>
+            <a:off x="3921624" y="1962618"/>
+            <a:ext cx="416625" cy="369332"/>
+          </a:xfrm>
+          <a:prstGeom prst="rect">
+            <a:avLst/>
+          </a:prstGeom>
+          <a:noFill/>
+        </p:spPr>
+        <p:txBody>
+          <a:bodyPr wrap="none" rtlCol="0">
+            <a:spAutoFit/>
+          </a:bodyPr>
+          <a:lstStyle/>
+          <a:p>
+            <a:r>
+              <a:rPr lang="en-US" dirty="0" smtClean="0"/>
+              <a:t>#2</a:t>
+            </a:r>
+            <a:endParaRPr lang="en-US" dirty="0"/>
+          </a:p>
+        </p:txBody>
+      </p:sp>
+      <p:sp>
+        <p:nvSpPr>
+          <p:cNvPr id="42" name="TextBox 41"/>
+          <p:cNvSpPr txBox="1"/>
+          <p:nvPr/>
+        </p:nvSpPr>
+        <p:spPr>
+          <a:xfrm>
+            <a:off x="577076" y="1956812"/>
+            <a:ext cx="812165" cy="276999"/>
+          </a:xfrm>
+          <a:prstGeom prst="rect">
+            <a:avLst/>
+          </a:prstGeom>
+          <a:noFill/>
+        </p:spPr>
+        <p:txBody>
+          <a:bodyPr wrap="square" rtlCol="0">
+            <a:spAutoFit/>
+          </a:bodyPr>
+          <a:lstStyle/>
+          <a:p>
+            <a:r>
+              <a:rPr lang="en-US" sz="1200" dirty="0" smtClean="0"/>
+              <a:t>New Pass</a:t>
+            </a:r>
+            <a:r>
+              <a:rPr lang="en-US" sz="1200" dirty="0" smtClean="0"/>
+              <a:t>:</a:t>
+            </a:r>
+            <a:endParaRPr lang="en-US" sz="1200" dirty="0"/>
+          </a:p>
+        </p:txBody>
+      </p:sp>
+      <p:sp>
+        <p:nvSpPr>
+          <p:cNvPr id="47" name="Rectangle 46"/>
+          <p:cNvSpPr/>
+          <p:nvPr/>
+        </p:nvSpPr>
+        <p:spPr>
+          <a:xfrm>
+            <a:off x="1389242" y="2022019"/>
+            <a:ext cx="1950262" cy="286508"/>
+          </a:xfrm>
+          <a:prstGeom prst="rect">
+            <a:avLst/>
+          </a:prstGeom>
+          <a:ln w="3175" cmpd="sng">
+            <a:solidFill>
+              <a:srgbClr val="000000"/>
+            </a:solidFill>
+          </a:ln>
+        </p:spPr>
+        <p:style>
+          <a:lnRef idx="2">
+            <a:schemeClr val="accent6"/>
+          </a:lnRef>
+          <a:fillRef idx="1">
+            <a:schemeClr val="lt1"/>
+          </a:fillRef>
+          <a:effectRef idx="0">
+            <a:schemeClr val="accent6"/>
+          </a:effectRef>
+          <a:fontRef idx="minor">
+            <a:schemeClr val="dk1"/>
+          </a:fontRef>
+        </p:style>
+        <p:txBody>
+          <a:bodyPr rtlCol="0" anchor="ctr"/>
+          <a:lstStyle/>
+          <a:p>
+            <a:pPr algn="ctr"/>
+            <a:endParaRPr lang="en-US"/>
+          </a:p>
+        </p:txBody>
+      </p:sp>
+      <p:cxnSp>
+        <p:nvCxnSpPr>
+          <p:cNvPr id="48" name="Straight Arrow Connector 47"/>
+          <p:cNvCxnSpPr/>
+          <p:nvPr/>
+        </p:nvCxnSpPr>
+        <p:spPr>
+          <a:xfrm>
+            <a:off x="3381872" y="2157562"/>
+            <a:ext cx="609600" cy="0"/>
+          </a:xfrm>
+          <a:prstGeom prst="straightConnector1">
+            <a:avLst/>
+          </a:prstGeom>
+          <a:ln w="3175" cmpd="sng">
+            <a:solidFill>
+              <a:srgbClr val="000000"/>
+            </a:solidFill>
+            <a:headEnd type="none"/>
+            <a:tailEnd type="arrow"/>
+          </a:ln>
+          <a:effectLst/>
+        </p:spPr>
+        <p:style>
+          <a:lnRef idx="2">
+            <a:schemeClr val="accent1"/>
+          </a:lnRef>
+          <a:fillRef idx="0">
+            <a:schemeClr val="accent1"/>
+          </a:fillRef>
+          <a:effectRef idx="1">
+            <a:schemeClr val="accent1"/>
+          </a:effectRef>
+          <a:fontRef idx="minor">
+            <a:schemeClr val="tx1"/>
+          </a:fontRef>
+        </p:style>
+      </p:cxnSp>
+      <p:grpSp>
+        <p:nvGrpSpPr>
+          <p:cNvPr id="59" name="Group 58"/>
+          <p:cNvGrpSpPr/>
+          <p:nvPr/>
+        </p:nvGrpSpPr>
+        <p:grpSpPr>
+          <a:xfrm>
+            <a:off x="3456570" y="4075304"/>
+            <a:ext cx="2273130" cy="1100100"/>
+            <a:chOff x="2286943" y="3764000"/>
+            <a:chExt cx="2273130" cy="1100100"/>
+          </a:xfrm>
+        </p:grpSpPr>
+        <p:sp>
+          <p:nvSpPr>
+            <p:cNvPr id="60" name="Rounded Rectangle 59"/>
+            <p:cNvSpPr/>
+            <p:nvPr/>
+          </p:nvSpPr>
+          <p:spPr>
+            <a:xfrm>
+              <a:off x="2286943" y="3764000"/>
+              <a:ext cx="2246957" cy="1100100"/>
+            </a:xfrm>
+            <a:prstGeom prst="roundRect">
+              <a:avLst/>
+            </a:prstGeom>
+            <a:solidFill>
+              <a:schemeClr val="tx2">
+                <a:lumMod val="40000"/>
+                <a:lumOff val="60000"/>
+              </a:schemeClr>
+            </a:solidFill>
+          </p:spPr>
+          <p:style>
+            <a:lnRef idx="1">
+              <a:schemeClr val="accent1"/>
+            </a:lnRef>
+            <a:fillRef idx="3">
+              <a:schemeClr val="accent1"/>
+            </a:fillRef>
+            <a:effectRef idx="2">
+              <a:schemeClr val="accent1"/>
+            </a:effectRef>
+            <a:fontRef idx="minor">
+              <a:schemeClr val="lt1"/>
+            </a:fontRef>
+          </p:style>
+          <p:txBody>
+            <a:bodyPr rtlCol="0" anchor="ctr"/>
+            <a:lstStyle/>
+            <a:p>
+              <a:pPr algn="ctr"/>
+              <a:endParaRPr lang="en-US" dirty="0"/>
+            </a:p>
+          </p:txBody>
+        </p:sp>
+        <p:sp>
+          <p:nvSpPr>
+            <p:cNvPr id="61" name="TextBox 60"/>
+            <p:cNvSpPr txBox="1"/>
+            <p:nvPr/>
+          </p:nvSpPr>
+          <p:spPr>
+            <a:xfrm>
+              <a:off x="2408842" y="3910194"/>
+              <a:ext cx="1998057" cy="446276"/>
+            </a:xfrm>
+            <a:prstGeom prst="rect">
+              <a:avLst/>
+            </a:prstGeom>
+            <a:noFill/>
+          </p:spPr>
+          <p:txBody>
+            <a:bodyPr wrap="square" rtlCol="0">
+              <a:spAutoFit/>
+            </a:bodyPr>
+            <a:lstStyle/>
+            <a:p>
+              <a:pPr algn="ctr"/>
+              <a:r>
+                <a:rPr lang="en-US" sz="1100" dirty="0" smtClean="0"/>
+                <a:t>ERROR</a:t>
+              </a:r>
+            </a:p>
+            <a:p>
+              <a:pPr algn="ctr"/>
+              <a:r>
+                <a:rPr lang="en-US" sz="1200" dirty="0" smtClean="0"/>
+                <a:t>Old Pass is not correct</a:t>
+              </a:r>
+              <a:endParaRPr lang="en-US" sz="1200" dirty="0"/>
+            </a:p>
+          </p:txBody>
+        </p:sp>
+        <p:sp>
+          <p:nvSpPr>
+            <p:cNvPr id="62" name="Rounded Rectangle 61"/>
+            <p:cNvSpPr/>
+            <p:nvPr/>
+          </p:nvSpPr>
+          <p:spPr>
+            <a:xfrm>
+              <a:off x="2626498" y="4522915"/>
+              <a:ext cx="715684" cy="250569"/>
+            </a:xfrm>
+            <a:prstGeom prst="roundRect">
+              <a:avLst/>
+            </a:prstGeom>
+          </p:spPr>
+          <p:style>
+            <a:lnRef idx="1">
+              <a:schemeClr val="accent1"/>
+            </a:lnRef>
+            <a:fillRef idx="3">
+              <a:schemeClr val="accent1"/>
+            </a:fillRef>
+            <a:effectRef idx="2">
+              <a:schemeClr val="accent1"/>
+            </a:effectRef>
+            <a:fontRef idx="minor">
+              <a:schemeClr val="lt1"/>
+            </a:fontRef>
+          </p:style>
+          <p:txBody>
+            <a:bodyPr rtlCol="0" anchor="ctr"/>
+            <a:lstStyle/>
+            <a:p>
+              <a:pPr algn="ctr"/>
+              <a:r>
+                <a:rPr lang="en-US" sz="1000" dirty="0" smtClean="0"/>
+                <a:t>OK</a:t>
+              </a:r>
+              <a:endParaRPr lang="en-US" sz="1000" dirty="0"/>
+            </a:p>
+          </p:txBody>
+        </p:sp>
+        <p:sp>
+          <p:nvSpPr>
+            <p:cNvPr id="63" name="Rounded Rectangle 62"/>
+            <p:cNvSpPr/>
+            <p:nvPr/>
+          </p:nvSpPr>
+          <p:spPr>
+            <a:xfrm>
+              <a:off x="3543023" y="4522915"/>
+              <a:ext cx="713296" cy="250569"/>
+            </a:xfrm>
+            <a:prstGeom prst="roundRect">
+              <a:avLst/>
+            </a:prstGeom>
+          </p:spPr>
+          <p:style>
+            <a:lnRef idx="1">
+              <a:schemeClr val="accent1"/>
+            </a:lnRef>
+            <a:fillRef idx="3">
+              <a:schemeClr val="accent1"/>
+            </a:fillRef>
+            <a:effectRef idx="2">
+              <a:schemeClr val="accent1"/>
+            </a:effectRef>
+            <a:fontRef idx="minor">
+              <a:schemeClr val="lt1"/>
+            </a:fontRef>
+          </p:style>
+          <p:txBody>
+            <a:bodyPr rtlCol="0" anchor="ctr"/>
+            <a:lstStyle/>
+            <a:p>
+              <a:pPr algn="ctr"/>
+              <a:r>
+                <a:rPr lang="en-US" sz="1000" dirty="0" smtClean="0"/>
+                <a:t>CANCEL</a:t>
+              </a:r>
+              <a:endParaRPr lang="en-US" sz="1000" dirty="0"/>
+            </a:p>
+          </p:txBody>
+        </p:sp>
+        <p:sp>
+          <p:nvSpPr>
+            <p:cNvPr id="64" name="TextBox 63"/>
+            <p:cNvSpPr txBox="1"/>
+            <p:nvPr/>
+          </p:nvSpPr>
+          <p:spPr>
+            <a:xfrm>
+              <a:off x="4143448" y="3806900"/>
+              <a:ext cx="416625" cy="369332"/>
+            </a:xfrm>
+            <a:prstGeom prst="rect">
+              <a:avLst/>
+            </a:prstGeom>
+            <a:noFill/>
+          </p:spPr>
+          <p:txBody>
+            <a:bodyPr wrap="none" rtlCol="0">
+              <a:spAutoFit/>
+            </a:bodyPr>
+            <a:lstStyle/>
+            <a:p>
+              <a:r>
+                <a:rPr lang="en-US" dirty="0" smtClean="0"/>
+                <a:t>#7</a:t>
+              </a:r>
+              <a:endParaRPr lang="en-US" dirty="0"/>
+            </a:p>
+          </p:txBody>
+        </p:sp>
+      </p:grpSp>
+    </p:spTree>
+    <p:extLst>
+      <p:ext uri="{BB962C8B-B14F-4D97-AF65-F5344CB8AC3E}">
+        <p14:creationId xmlns:p14="http://schemas.microsoft.com/office/powerpoint/2010/main" val="195254062"/>
       </p:ext>
     </p:extLst>
   </p:cSld>

</xml_diff>

<commit_message>
finish 3 docs for post/comment
</commit_message>
<xml_diff>
--- a/spec/PHP_Training_Task17060_DesignApps(Regedit)_Ver_0.1.1.pptx
+++ b/spec/PHP_Training_Task17060_DesignApps(Regedit)_Ver_0.1.1.pptx
@@ -7,6 +7,7 @@
   <p:sldIdLst>
     <p:sldId id="256" r:id="rId2"/>
     <p:sldId id="257" r:id="rId3"/>
+    <p:sldId id="258" r:id="rId4"/>
   </p:sldIdLst>
   <p:sldSz cx="6858000" cy="9144000" type="screen4x3"/>
   <p:notesSz cx="6858000" cy="9144000"/>
@@ -289,7 +290,7 @@
           <a:p>
             <a:fld id="{303CFF4D-8D22-5B44-9F89-D3FEF775BD3F}" type="datetimeFigureOut">
               <a:rPr lang="en-US" smtClean="0"/>
-              <a:t>8/27/14</a:t>
+              <a:t>8/28/14</a:t>
             </a:fld>
             <a:endParaRPr lang="en-US"/>
           </a:p>
@@ -459,7 +460,7 @@
           <a:p>
             <a:fld id="{303CFF4D-8D22-5B44-9F89-D3FEF775BD3F}" type="datetimeFigureOut">
               <a:rPr lang="en-US" smtClean="0"/>
-              <a:t>8/27/14</a:t>
+              <a:t>8/28/14</a:t>
             </a:fld>
             <a:endParaRPr lang="en-US"/>
           </a:p>
@@ -639,7 +640,7 @@
           <a:p>
             <a:fld id="{303CFF4D-8D22-5B44-9F89-D3FEF775BD3F}" type="datetimeFigureOut">
               <a:rPr lang="en-US" smtClean="0"/>
-              <a:t>8/27/14</a:t>
+              <a:t>8/28/14</a:t>
             </a:fld>
             <a:endParaRPr lang="en-US"/>
           </a:p>
@@ -809,7 +810,7 @@
           <a:p>
             <a:fld id="{303CFF4D-8D22-5B44-9F89-D3FEF775BD3F}" type="datetimeFigureOut">
               <a:rPr lang="en-US" smtClean="0"/>
-              <a:t>8/27/14</a:t>
+              <a:t>8/28/14</a:t>
             </a:fld>
             <a:endParaRPr lang="en-US"/>
           </a:p>
@@ -1055,7 +1056,7 @@
           <a:p>
             <a:fld id="{303CFF4D-8D22-5B44-9F89-D3FEF775BD3F}" type="datetimeFigureOut">
               <a:rPr lang="en-US" smtClean="0"/>
-              <a:t>8/27/14</a:t>
+              <a:t>8/28/14</a:t>
             </a:fld>
             <a:endParaRPr lang="en-US"/>
           </a:p>
@@ -1343,7 +1344,7 @@
           <a:p>
             <a:fld id="{303CFF4D-8D22-5B44-9F89-D3FEF775BD3F}" type="datetimeFigureOut">
               <a:rPr lang="en-US" smtClean="0"/>
-              <a:t>8/27/14</a:t>
+              <a:t>8/28/14</a:t>
             </a:fld>
             <a:endParaRPr lang="en-US"/>
           </a:p>
@@ -1770,7 +1771,7 @@
           <a:p>
             <a:fld id="{303CFF4D-8D22-5B44-9F89-D3FEF775BD3F}" type="datetimeFigureOut">
               <a:rPr lang="en-US" smtClean="0"/>
-              <a:t>8/27/14</a:t>
+              <a:t>8/28/14</a:t>
             </a:fld>
             <a:endParaRPr lang="en-US"/>
           </a:p>
@@ -1888,7 +1889,7 @@
           <a:p>
             <a:fld id="{303CFF4D-8D22-5B44-9F89-D3FEF775BD3F}" type="datetimeFigureOut">
               <a:rPr lang="en-US" smtClean="0"/>
-              <a:t>8/27/14</a:t>
+              <a:t>8/28/14</a:t>
             </a:fld>
             <a:endParaRPr lang="en-US"/>
           </a:p>
@@ -1983,7 +1984,7 @@
           <a:p>
             <a:fld id="{303CFF4D-8D22-5B44-9F89-D3FEF775BD3F}" type="datetimeFigureOut">
               <a:rPr lang="en-US" smtClean="0"/>
-              <a:t>8/27/14</a:t>
+              <a:t>8/28/14</a:t>
             </a:fld>
             <a:endParaRPr lang="en-US"/>
           </a:p>
@@ -2260,7 +2261,7 @@
           <a:p>
             <a:fld id="{303CFF4D-8D22-5B44-9F89-D3FEF775BD3F}" type="datetimeFigureOut">
               <a:rPr lang="en-US" smtClean="0"/>
-              <a:t>8/27/14</a:t>
+              <a:t>8/28/14</a:t>
             </a:fld>
             <a:endParaRPr lang="en-US"/>
           </a:p>
@@ -2513,7 +2514,7 @@
           <a:p>
             <a:fld id="{303CFF4D-8D22-5B44-9F89-D3FEF775BD3F}" type="datetimeFigureOut">
               <a:rPr lang="en-US" smtClean="0"/>
-              <a:t>8/27/14</a:t>
+              <a:t>8/28/14</a:t>
             </a:fld>
             <a:endParaRPr lang="en-US"/>
           </a:p>
@@ -2726,7 +2727,7 @@
           <a:p>
             <a:fld id="{303CFF4D-8D22-5B44-9F89-D3FEF775BD3F}" type="datetimeFigureOut">
               <a:rPr lang="en-US" smtClean="0"/>
-              <a:t>8/27/14</a:t>
+              <a:t>8/28/14</a:t>
             </a:fld>
             <a:endParaRPr lang="en-US"/>
           </a:p>
@@ -5679,11 +5680,7 @@
           <a:p>
             <a:r>
               <a:rPr lang="en-US" sz="1200" dirty="0" smtClean="0"/>
-              <a:t>Old Pass</a:t>
-            </a:r>
-            <a:r>
-              <a:rPr lang="en-US" sz="1200" dirty="0" smtClean="0"/>
-              <a:t>:</a:t>
+              <a:t>Old Pass:</a:t>
             </a:r>
             <a:endParaRPr lang="en-US" sz="1200" dirty="0"/>
           </a:p>
@@ -6205,11 +6202,7 @@
                     <a:p>
                       <a:r>
                         <a:rPr lang="en-US" sz="1200" dirty="0" smtClean="0"/>
-                        <a:t>Old Pass/New Pass/Pass </a:t>
-                      </a:r>
-                      <a:r>
-                        <a:rPr lang="en-US" sz="1200" dirty="0" smtClean="0"/>
-                        <a:t>again</a:t>
+                        <a:t>Old Pass/New Pass/Pass again</a:t>
                       </a:r>
                       <a:endParaRPr lang="en-US" sz="1200" dirty="0"/>
                     </a:p>
@@ -6608,15 +6601,7 @@
                     <a:p>
                       <a:r>
                         <a:rPr kumimoji="1" lang="en-US" altLang="ja-JP" sz="1000" dirty="0" smtClean="0"/>
-                        <a:t>Put the user’s </a:t>
-                      </a:r>
-                      <a:r>
-                        <a:rPr kumimoji="1" lang="en-US" altLang="ja-JP" sz="1000" dirty="0" smtClean="0"/>
-                        <a:t>new password </a:t>
-                      </a:r>
-                      <a:r>
-                        <a:rPr kumimoji="1" lang="en-US" altLang="ja-JP" sz="1000" dirty="0" smtClean="0"/>
-                        <a:t>in here.</a:t>
+                        <a:t>Put the user’s new password in here.</a:t>
                       </a:r>
                       <a:endParaRPr kumimoji="1" lang="ja-JP" altLang="en-US" sz="1000" b="0" dirty="0"/>
                     </a:p>
@@ -6695,15 +6680,7 @@
                       </a:pPr>
                       <a:r>
                         <a:rPr kumimoji="1" lang="en-US" altLang="ja-JP" sz="1000" dirty="0" smtClean="0"/>
-                        <a:t>Put the user’s </a:t>
-                      </a:r>
-                      <a:r>
-                        <a:rPr kumimoji="1" lang="en-US" altLang="ja-JP" sz="1000" dirty="0" smtClean="0"/>
-                        <a:t>new password </a:t>
-                      </a:r>
-                      <a:r>
-                        <a:rPr kumimoji="1" lang="en-US" altLang="ja-JP" sz="1000" dirty="0" smtClean="0"/>
-                        <a:t>again  here.</a:t>
+                        <a:t>Put the user’s new password again  here.</a:t>
                       </a:r>
                       <a:endParaRPr kumimoji="1" lang="ja-JP" altLang="en-US" sz="1000" b="0" dirty="0"/>
                     </a:p>
@@ -6752,15 +6729,7 @@
                       </a:r>
                       <a:r>
                         <a:rPr kumimoji="1" lang="en-US" altLang="ja-JP" sz="1000" baseline="0" dirty="0" smtClean="0"/>
-                        <a:t> want cancel </a:t>
-                      </a:r>
-                      <a:r>
-                        <a:rPr kumimoji="1" lang="en-US" altLang="ja-JP" sz="1000" baseline="0" dirty="0" smtClean="0"/>
-                        <a:t>Update new password, </a:t>
-                      </a:r>
-                      <a:r>
-                        <a:rPr kumimoji="1" lang="en-US" altLang="ja-JP" sz="1000" baseline="0" dirty="0" smtClean="0"/>
-                        <a:t>click here. </a:t>
+                        <a:t> want cancel Update new password, click here. </a:t>
                       </a:r>
                       <a:endParaRPr kumimoji="1" lang="ja-JP" altLang="en-US" sz="1000" b="0" dirty="0"/>
                     </a:p>
@@ -6826,11 +6795,7 @@
                       </a:pPr>
                       <a:r>
                         <a:rPr kumimoji="1" lang="en-US" altLang="ja-JP" sz="1000" dirty="0" smtClean="0"/>
-                        <a:t>When the button is pressed, the </a:t>
-                      </a:r>
-                      <a:r>
-                        <a:rPr kumimoji="1" lang="en-US" altLang="ja-JP" sz="1000" dirty="0" smtClean="0"/>
-                        <a:t>old</a:t>
+                        <a:t>When the button is pressed, the old</a:t>
                       </a:r>
                       <a:r>
                         <a:rPr kumimoji="1" lang="en-US" altLang="ja-JP" sz="1000" baseline="0" dirty="0" smtClean="0"/>
@@ -6838,11 +6803,7 @@
                       </a:r>
                       <a:r>
                         <a:rPr kumimoji="1" lang="en-US" altLang="ja-JP" sz="1000" dirty="0" smtClean="0"/>
-                        <a:t>and password, password again </a:t>
-                      </a:r>
-                      <a:r>
-                        <a:rPr kumimoji="1" lang="en-US" altLang="ja-JP" sz="1000" dirty="0" smtClean="0"/>
-                        <a:t>are checked with case #7 and #8. If it’s correct, move to the 004</a:t>
+                        <a:t>and password, password again are checked with case #7 and #8. If it’s correct, move to the 004</a:t>
                       </a:r>
                       <a:r>
                         <a:rPr kumimoji="1" lang="en-US" altLang="ja-JP" sz="1000" baseline="0" dirty="0" smtClean="0"/>
@@ -6850,11 +6811,7 @@
                       </a:r>
                       <a:r>
                         <a:rPr kumimoji="1" lang="en-US" altLang="ja-JP" sz="1000" dirty="0" smtClean="0"/>
-                        <a:t>screen. If it’s failed, show popup error message ( error screen </a:t>
-                      </a:r>
-                      <a:r>
-                        <a:rPr kumimoji="1" lang="en-US" altLang="ja-JP" sz="1000" dirty="0" smtClean="0"/>
-                        <a:t>)</a:t>
+                        <a:t>screen. If it’s failed, show popup error message ( error screen )</a:t>
                       </a:r>
                       <a:endParaRPr kumimoji="1" lang="en-US" altLang="ja-JP" sz="1000" b="0" dirty="0" smtClean="0"/>
                     </a:p>
@@ -7087,7 +7044,7 @@
                     <a:srgbClr val="000000"/>
                   </a:solidFill>
                 </a:rPr>
-                <a:t>Regedit</a:t>
+                <a:t>Update password</a:t>
               </a:r>
               <a:endParaRPr lang="en-US" sz="1800" dirty="0">
                 <a:solidFill>
@@ -7422,11 +7379,7 @@
           <a:p>
             <a:r>
               <a:rPr lang="en-US" sz="1200" dirty="0" smtClean="0"/>
-              <a:t>New Pass</a:t>
-            </a:r>
-            <a:r>
-              <a:rPr lang="en-US" sz="1200" dirty="0" smtClean="0"/>
-              <a:t>:</a:t>
+              <a:t>New Pass:</a:t>
             </a:r>
             <a:endParaRPr lang="en-US" sz="1200" dirty="0"/>
           </a:p>
@@ -7728,6 +7681,1237 @@
     <p:extLst>
       <p:ext uri="{BB962C8B-B14F-4D97-AF65-F5344CB8AC3E}">
         <p14:creationId xmlns:p14="http://schemas.microsoft.com/office/powerpoint/2010/main" val="195254062"/>
+      </p:ext>
+    </p:extLst>
+  </p:cSld>
+  <p:clrMapOvr>
+    <a:masterClrMapping/>
+  </p:clrMapOvr>
+  <p:timing>
+    <p:tnLst>
+      <p:par>
+        <p:cTn xmlns:p14="http://schemas.microsoft.com/office/powerpoint/2010/main" id="1" dur="indefinite" restart="never" nodeType="tmRoot"/>
+      </p:par>
+    </p:tnLst>
+  </p:timing>
+</p:sld>
+</file>
+
+<file path=ppt/slides/slide3.xml><?xml version="1.0" encoding="utf-8"?>
+<p:sld xmlns:a="http://schemas.openxmlformats.org/drawingml/2006/main" xmlns:r="http://schemas.openxmlformats.org/officeDocument/2006/relationships" xmlns:p="http://schemas.openxmlformats.org/presentationml/2006/main">
+  <p:cSld>
+    <p:spTree>
+      <p:nvGrpSpPr>
+        <p:cNvPr id="1" name=""/>
+        <p:cNvGrpSpPr/>
+        <p:nvPr/>
+      </p:nvGrpSpPr>
+      <p:grpSpPr>
+        <a:xfrm>
+          <a:off x="0" y="0"/>
+          <a:ext cx="0" cy="0"/>
+          <a:chOff x="0" y="0"/>
+          <a:chExt cx="0" cy="0"/>
+        </a:xfrm>
+      </p:grpSpPr>
+      <p:sp>
+        <p:nvSpPr>
+          <p:cNvPr id="4" name="Rectangle 3"/>
+          <p:cNvSpPr/>
+          <p:nvPr/>
+        </p:nvSpPr>
+        <p:spPr>
+          <a:xfrm>
+            <a:off x="396241" y="806630"/>
+            <a:ext cx="6041020" cy="2363290"/>
+          </a:xfrm>
+          <a:prstGeom prst="rect">
+            <a:avLst/>
+          </a:prstGeom>
+          <a:solidFill>
+            <a:schemeClr val="bg1"/>
+          </a:solidFill>
+        </p:spPr>
+        <p:style>
+          <a:lnRef idx="1">
+            <a:schemeClr val="accent1"/>
+          </a:lnRef>
+          <a:fillRef idx="3">
+            <a:schemeClr val="accent1"/>
+          </a:fillRef>
+          <a:effectRef idx="2">
+            <a:schemeClr val="accent1"/>
+          </a:effectRef>
+          <a:fontRef idx="minor">
+            <a:schemeClr val="lt1"/>
+          </a:fontRef>
+        </p:style>
+        <p:txBody>
+          <a:bodyPr rtlCol="0" anchor="ctr"/>
+          <a:lstStyle/>
+          <a:p>
+            <a:pPr algn="ctr"/>
+            <a:endParaRPr lang="en-US" dirty="0"/>
+          </a:p>
+        </p:txBody>
+      </p:sp>
+      <p:sp>
+        <p:nvSpPr>
+          <p:cNvPr id="5" name="TextBox 4"/>
+          <p:cNvSpPr txBox="1"/>
+          <p:nvPr/>
+        </p:nvSpPr>
+        <p:spPr>
+          <a:xfrm>
+            <a:off x="2044856" y="1014966"/>
+            <a:ext cx="2894593" cy="369332"/>
+          </a:xfrm>
+          <a:prstGeom prst="rect">
+            <a:avLst/>
+          </a:prstGeom>
+          <a:noFill/>
+        </p:spPr>
+        <p:txBody>
+          <a:bodyPr wrap="square" rtlCol="0">
+            <a:spAutoFit/>
+          </a:bodyPr>
+          <a:lstStyle/>
+          <a:p>
+            <a:pPr algn="ctr"/>
+            <a:r>
+              <a:rPr lang="en-US" dirty="0" smtClean="0"/>
+              <a:t>Compose a post/comment</a:t>
+            </a:r>
+            <a:endParaRPr lang="en-US" dirty="0"/>
+          </a:p>
+        </p:txBody>
+      </p:sp>
+      <p:sp>
+        <p:nvSpPr>
+          <p:cNvPr id="6" name="TextBox 5"/>
+          <p:cNvSpPr txBox="1"/>
+          <p:nvPr/>
+        </p:nvSpPr>
+        <p:spPr>
+          <a:xfrm>
+            <a:off x="631908" y="1826139"/>
+            <a:ext cx="741636" cy="276999"/>
+          </a:xfrm>
+          <a:prstGeom prst="rect">
+            <a:avLst/>
+          </a:prstGeom>
+          <a:noFill/>
+        </p:spPr>
+        <p:txBody>
+          <a:bodyPr wrap="square" rtlCol="0">
+            <a:spAutoFit/>
+          </a:bodyPr>
+          <a:lstStyle/>
+          <a:p>
+            <a:r>
+              <a:rPr lang="en-US" sz="1200" dirty="0" smtClean="0"/>
+              <a:t>Content:</a:t>
+            </a:r>
+            <a:endParaRPr lang="en-US" sz="1200" dirty="0"/>
+          </a:p>
+        </p:txBody>
+      </p:sp>
+      <p:sp>
+        <p:nvSpPr>
+          <p:cNvPr id="7" name="Rectangle 6"/>
+          <p:cNvSpPr/>
+          <p:nvPr/>
+        </p:nvSpPr>
+        <p:spPr>
+          <a:xfrm>
+            <a:off x="1391920" y="1663698"/>
+            <a:ext cx="4693920" cy="774702"/>
+          </a:xfrm>
+          <a:prstGeom prst="rect">
+            <a:avLst/>
+          </a:prstGeom>
+          <a:ln/>
+        </p:spPr>
+        <p:style>
+          <a:lnRef idx="2">
+            <a:schemeClr val="dk1"/>
+          </a:lnRef>
+          <a:fillRef idx="1">
+            <a:schemeClr val="lt1"/>
+          </a:fillRef>
+          <a:effectRef idx="0">
+            <a:schemeClr val="dk1"/>
+          </a:effectRef>
+          <a:fontRef idx="minor">
+            <a:schemeClr val="dk1"/>
+          </a:fontRef>
+        </p:style>
+        <p:txBody>
+          <a:bodyPr rtlCol="0" anchor="ctr"/>
+          <a:lstStyle/>
+          <a:p>
+            <a:pPr algn="ctr"/>
+            <a:endParaRPr lang="en-US" dirty="0"/>
+          </a:p>
+        </p:txBody>
+      </p:sp>
+      <p:sp>
+        <p:nvSpPr>
+          <p:cNvPr id="12" name="Rounded Rectangle 11"/>
+          <p:cNvSpPr/>
+          <p:nvPr/>
+        </p:nvSpPr>
+        <p:spPr>
+          <a:xfrm>
+            <a:off x="2566856" y="2568334"/>
+            <a:ext cx="1079500" cy="355600"/>
+          </a:xfrm>
+          <a:prstGeom prst="roundRect">
+            <a:avLst/>
+          </a:prstGeom>
+        </p:spPr>
+        <p:style>
+          <a:lnRef idx="1">
+            <a:schemeClr val="accent1"/>
+          </a:lnRef>
+          <a:fillRef idx="3">
+            <a:schemeClr val="accent1"/>
+          </a:fillRef>
+          <a:effectRef idx="2">
+            <a:schemeClr val="accent1"/>
+          </a:effectRef>
+          <a:fontRef idx="minor">
+            <a:schemeClr val="lt1"/>
+          </a:fontRef>
+        </p:style>
+        <p:txBody>
+          <a:bodyPr rtlCol="0" anchor="ctr"/>
+          <a:lstStyle/>
+          <a:p>
+            <a:pPr algn="ctr"/>
+            <a:r>
+              <a:rPr lang="en-US" sz="1400" dirty="0" smtClean="0"/>
+              <a:t>Cancel</a:t>
+            </a:r>
+            <a:endParaRPr lang="en-US" sz="1400" dirty="0"/>
+          </a:p>
+        </p:txBody>
+      </p:sp>
+      <p:sp>
+        <p:nvSpPr>
+          <p:cNvPr id="13" name="Rounded Rectangle 12"/>
+          <p:cNvSpPr/>
+          <p:nvPr/>
+        </p:nvSpPr>
+        <p:spPr>
+          <a:xfrm>
+            <a:off x="3747956" y="2581034"/>
+            <a:ext cx="1066800" cy="342900"/>
+          </a:xfrm>
+          <a:prstGeom prst="roundRect">
+            <a:avLst/>
+          </a:prstGeom>
+        </p:spPr>
+        <p:style>
+          <a:lnRef idx="1">
+            <a:schemeClr val="accent1"/>
+          </a:lnRef>
+          <a:fillRef idx="3">
+            <a:schemeClr val="accent1"/>
+          </a:fillRef>
+          <a:effectRef idx="2">
+            <a:schemeClr val="accent1"/>
+          </a:effectRef>
+          <a:fontRef idx="minor">
+            <a:schemeClr val="lt1"/>
+          </a:fontRef>
+        </p:style>
+        <p:txBody>
+          <a:bodyPr rtlCol="0" anchor="ctr"/>
+          <a:lstStyle/>
+          <a:p>
+            <a:pPr algn="ctr"/>
+            <a:r>
+              <a:rPr lang="en-US" sz="1400" dirty="0" smtClean="0"/>
+              <a:t>Done</a:t>
+            </a:r>
+            <a:endParaRPr lang="en-US" sz="1400" dirty="0"/>
+          </a:p>
+        </p:txBody>
+      </p:sp>
+      <p:sp>
+        <p:nvSpPr>
+          <p:cNvPr id="15" name="TextBox 14"/>
+          <p:cNvSpPr txBox="1"/>
+          <p:nvPr/>
+        </p:nvSpPr>
+        <p:spPr>
+          <a:xfrm>
+            <a:off x="6674907" y="1783017"/>
+            <a:ext cx="416625" cy="369332"/>
+          </a:xfrm>
+          <a:prstGeom prst="rect">
+            <a:avLst/>
+          </a:prstGeom>
+          <a:noFill/>
+        </p:spPr>
+        <p:txBody>
+          <a:bodyPr wrap="none" rtlCol="0">
+            <a:spAutoFit/>
+          </a:bodyPr>
+          <a:lstStyle/>
+          <a:p>
+            <a:r>
+              <a:rPr lang="en-US" dirty="0" smtClean="0"/>
+              <a:t>#1</a:t>
+            </a:r>
+            <a:endParaRPr lang="en-US" dirty="0"/>
+          </a:p>
+        </p:txBody>
+      </p:sp>
+      <p:cxnSp>
+        <p:nvCxnSpPr>
+          <p:cNvPr id="22" name="Straight Arrow Connector 21"/>
+          <p:cNvCxnSpPr/>
+          <p:nvPr/>
+        </p:nvCxnSpPr>
+        <p:spPr>
+          <a:xfrm>
+            <a:off x="6105268" y="1971058"/>
+            <a:ext cx="609600" cy="0"/>
+          </a:xfrm>
+          <a:prstGeom prst="straightConnector1">
+            <a:avLst/>
+          </a:prstGeom>
+          <a:ln w="3175" cmpd="sng">
+            <a:solidFill>
+              <a:srgbClr val="000000"/>
+            </a:solidFill>
+            <a:headEnd type="none"/>
+            <a:tailEnd type="arrow"/>
+          </a:ln>
+          <a:effectLst/>
+        </p:spPr>
+        <p:style>
+          <a:lnRef idx="2">
+            <a:schemeClr val="accent1"/>
+          </a:lnRef>
+          <a:fillRef idx="0">
+            <a:schemeClr val="accent1"/>
+          </a:fillRef>
+          <a:effectRef idx="1">
+            <a:schemeClr val="accent1"/>
+          </a:effectRef>
+          <a:fontRef idx="minor">
+            <a:schemeClr val="tx1"/>
+          </a:fontRef>
+        </p:style>
+      </p:cxnSp>
+      <p:graphicFrame>
+        <p:nvGraphicFramePr>
+          <p:cNvPr id="36" name="Table 35"/>
+          <p:cNvGraphicFramePr>
+            <a:graphicFrameLocks noGrp="1"/>
+          </p:cNvGraphicFramePr>
+          <p:nvPr>
+            <p:extLst>
+              <p:ext uri="{D42A27DB-BD31-4B8C-83A1-F6EECF244321}">
+                <p14:modId xmlns:p14="http://schemas.microsoft.com/office/powerpoint/2010/main" val="1957868693"/>
+              </p:ext>
+            </p:extLst>
+          </p:nvPr>
+        </p:nvGraphicFramePr>
+        <p:xfrm>
+          <a:off x="524299" y="4180742"/>
+          <a:ext cx="2310805" cy="926154"/>
+        </p:xfrm>
+        <a:graphic>
+          <a:graphicData uri="http://schemas.openxmlformats.org/drawingml/2006/table">
+            <a:tbl>
+              <a:tblPr firstRow="1" bandRow="1">
+                <a:tableStyleId>{5C22544A-7EE6-4342-B048-85BDC9FD1C3A}</a:tableStyleId>
+              </a:tblPr>
+              <a:tblGrid>
+                <a:gridCol w="1277553"/>
+                <a:gridCol w="1033252"/>
+              </a:tblGrid>
+              <a:tr h="463439">
+                <a:tc>
+                  <a:txBody>
+                    <a:bodyPr/>
+                    <a:lstStyle/>
+                    <a:p>
+                      <a:pPr algn="ctr"/>
+                      <a:r>
+                        <a:rPr lang="en-US" sz="1200" dirty="0" smtClean="0"/>
+                        <a:t>Parameter</a:t>
+                      </a:r>
+                      <a:endParaRPr lang="en-US" sz="1200" dirty="0"/>
+                    </a:p>
+                  </a:txBody>
+                  <a:tcPr marT="91440" marB="91440"/>
+                </a:tc>
+                <a:tc>
+                  <a:txBody>
+                    <a:bodyPr/>
+                    <a:lstStyle/>
+                    <a:p>
+                      <a:pPr algn="ctr"/>
+                      <a:r>
+                        <a:rPr lang="en-US" sz="1200" dirty="0" smtClean="0"/>
+                        <a:t>Type</a:t>
+                      </a:r>
+                      <a:endParaRPr lang="en-US" sz="1200" dirty="0"/>
+                    </a:p>
+                  </a:txBody>
+                  <a:tcPr marT="91440" marB="91440"/>
+                </a:tc>
+              </a:tr>
+              <a:tr h="462715">
+                <a:tc>
+                  <a:txBody>
+                    <a:bodyPr/>
+                    <a:lstStyle/>
+                    <a:p>
+                      <a:r>
+                        <a:rPr lang="en-US" sz="1200" dirty="0" smtClean="0"/>
+                        <a:t>Post</a:t>
+                      </a:r>
+                      <a:r>
+                        <a:rPr lang="en-US" sz="1200" baseline="0" dirty="0" smtClean="0"/>
+                        <a:t> content</a:t>
+                      </a:r>
+                      <a:endParaRPr lang="en-US" sz="1200" dirty="0"/>
+                    </a:p>
+                  </a:txBody>
+                  <a:tcPr marT="91440" marB="91440"/>
+                </a:tc>
+                <a:tc>
+                  <a:txBody>
+                    <a:bodyPr/>
+                    <a:lstStyle/>
+                    <a:p>
+                      <a:pPr algn="ctr"/>
+                      <a:r>
+                        <a:rPr lang="en-US" sz="1200" dirty="0" smtClean="0"/>
+                        <a:t>Text</a:t>
+                      </a:r>
+                      <a:endParaRPr lang="en-US" sz="1200" dirty="0"/>
+                    </a:p>
+                  </a:txBody>
+                  <a:tcPr marT="91440" marB="91440"/>
+                </a:tc>
+              </a:tr>
+            </a:tbl>
+          </a:graphicData>
+        </a:graphic>
+      </p:graphicFrame>
+      <p:sp>
+        <p:nvSpPr>
+          <p:cNvPr id="37" name="TextBox 36"/>
+          <p:cNvSpPr txBox="1"/>
+          <p:nvPr/>
+        </p:nvSpPr>
+        <p:spPr>
+          <a:xfrm>
+            <a:off x="396241" y="3705097"/>
+            <a:ext cx="2153043" cy="295934"/>
+          </a:xfrm>
+          <a:prstGeom prst="rect">
+            <a:avLst/>
+          </a:prstGeom>
+          <a:noFill/>
+        </p:spPr>
+        <p:txBody>
+          <a:bodyPr wrap="square" lIns="140671" tIns="70336" rIns="140671" bIns="70336" rtlCol="0">
+            <a:spAutoFit/>
+          </a:bodyPr>
+          <a:lstStyle/>
+          <a:p>
+            <a:r>
+              <a:rPr lang="en-US" sz="1000" dirty="0" smtClean="0">
+                <a:latin typeface="Tahoma"/>
+                <a:cs typeface="Tahoma"/>
+              </a:rPr>
+              <a:t>Using </a:t>
+            </a:r>
+            <a:r>
+              <a:rPr lang="en-US" altLang="ja-JP" sz="1000" dirty="0" smtClean="0">
+                <a:latin typeface="Tahoma"/>
+                <a:ea typeface="メイリオ"/>
+                <a:cs typeface="Tahoma"/>
+              </a:rPr>
+              <a:t>API: </a:t>
+            </a:r>
+            <a:r>
+              <a:rPr lang="en-US" altLang="ja-JP" sz="1000" dirty="0" err="1" smtClean="0">
+                <a:latin typeface="Tahoma"/>
+                <a:ea typeface="メイリオ"/>
+                <a:cs typeface="Tahoma"/>
+              </a:rPr>
+              <a:t>post_comment</a:t>
+            </a:r>
+            <a:endParaRPr lang="en-US" sz="1000" dirty="0">
+              <a:latin typeface="Tahoma"/>
+              <a:cs typeface="Tahoma"/>
+            </a:endParaRPr>
+          </a:p>
+        </p:txBody>
+      </p:sp>
+      <p:sp>
+        <p:nvSpPr>
+          <p:cNvPr id="38" name="Rectangle 37"/>
+          <p:cNvSpPr/>
+          <p:nvPr/>
+        </p:nvSpPr>
+        <p:spPr>
+          <a:xfrm>
+            <a:off x="3439212" y="4133354"/>
+            <a:ext cx="2310808" cy="1069874"/>
+          </a:xfrm>
+          <a:prstGeom prst="rect">
+            <a:avLst/>
+          </a:prstGeom>
+        </p:spPr>
+        <p:style>
+          <a:lnRef idx="2">
+            <a:schemeClr val="accent3"/>
+          </a:lnRef>
+          <a:fillRef idx="1">
+            <a:schemeClr val="lt1"/>
+          </a:fillRef>
+          <a:effectRef idx="0">
+            <a:schemeClr val="accent3"/>
+          </a:effectRef>
+          <a:fontRef idx="minor">
+            <a:schemeClr val="dk1"/>
+          </a:fontRef>
+        </p:style>
+        <p:txBody>
+          <a:bodyPr lIns="140671" tIns="70336" rIns="140671" bIns="70336" spcCol="0" rtlCol="0" anchor="ctr"/>
+          <a:lstStyle/>
+          <a:p>
+            <a:pPr marL="439598" indent="-439598" algn="just">
+              <a:buFont typeface="Wingdings" charset="2"/>
+              <a:buChar char="ü"/>
+            </a:pPr>
+            <a:r>
+              <a:rPr lang="en-US" altLang="ja-JP" sz="1200" kern="0" dirty="0" smtClean="0">
+                <a:solidFill>
+                  <a:schemeClr val="tx1"/>
+                </a:solidFill>
+                <a:latin typeface="Tahoma"/>
+                <a:ea typeface="メイリオ"/>
+                <a:cs typeface="Tahoma"/>
+              </a:rPr>
+              <a:t>When you up a post with </a:t>
+            </a:r>
+            <a:r>
+              <a:rPr lang="en-US" altLang="ja-JP" sz="1200" kern="0" dirty="0" err="1" smtClean="0">
+                <a:solidFill>
+                  <a:schemeClr val="tx1"/>
+                </a:solidFill>
+                <a:latin typeface="Tahoma"/>
+                <a:ea typeface="メイリオ"/>
+                <a:cs typeface="Tahoma"/>
+              </a:rPr>
+              <a:t>post_id</a:t>
+            </a:r>
+            <a:r>
+              <a:rPr lang="en-US" altLang="ja-JP" sz="1200" kern="0" dirty="0" smtClean="0">
+                <a:solidFill>
+                  <a:schemeClr val="tx1"/>
+                </a:solidFill>
+                <a:latin typeface="Tahoma"/>
+                <a:ea typeface="メイリオ"/>
+                <a:cs typeface="Tahoma"/>
+              </a:rPr>
+              <a:t> it’s a comment for post with that id. If not it’s a post.</a:t>
+            </a:r>
+          </a:p>
+          <a:p>
+            <a:pPr marL="439598" indent="-439598" algn="just">
+              <a:buFont typeface="Wingdings" charset="2"/>
+              <a:buChar char="ü"/>
+            </a:pPr>
+            <a:endParaRPr lang="en-US" altLang="ja-JP" sz="1200" kern="0" dirty="0">
+              <a:solidFill>
+                <a:schemeClr val="tx1"/>
+              </a:solidFill>
+              <a:latin typeface="Tahoma"/>
+              <a:ea typeface="メイリオ"/>
+              <a:cs typeface="Tahoma"/>
+            </a:endParaRPr>
+          </a:p>
+        </p:txBody>
+      </p:sp>
+      <p:sp>
+        <p:nvSpPr>
+          <p:cNvPr id="39" name="TextBox 38"/>
+          <p:cNvSpPr txBox="1"/>
+          <p:nvPr/>
+        </p:nvSpPr>
+        <p:spPr>
+          <a:xfrm>
+            <a:off x="3383615" y="3823253"/>
+            <a:ext cx="2346085" cy="357489"/>
+          </a:xfrm>
+          <a:prstGeom prst="rect">
+            <a:avLst/>
+          </a:prstGeom>
+          <a:noFill/>
+        </p:spPr>
+        <p:txBody>
+          <a:bodyPr wrap="square" lIns="140671" tIns="70336" rIns="140671" bIns="70336" rtlCol="0">
+            <a:spAutoFit/>
+          </a:bodyPr>
+          <a:lstStyle/>
+          <a:p>
+            <a:r>
+              <a:rPr lang="en-US" sz="1400" dirty="0" smtClean="0"/>
+              <a:t>Note:</a:t>
+            </a:r>
+            <a:endParaRPr lang="en-US" sz="1400" dirty="0"/>
+          </a:p>
+        </p:txBody>
+      </p:sp>
+      <p:sp>
+        <p:nvSpPr>
+          <p:cNvPr id="41" name="テキスト ボックス 89"/>
+          <p:cNvSpPr txBox="1"/>
+          <p:nvPr/>
+        </p:nvSpPr>
+        <p:spPr>
+          <a:xfrm>
+            <a:off x="94550" y="449141"/>
+            <a:ext cx="1635346" cy="357489"/>
+          </a:xfrm>
+          <a:prstGeom prst="rect">
+            <a:avLst/>
+          </a:prstGeom>
+          <a:noFill/>
+        </p:spPr>
+        <p:txBody>
+          <a:bodyPr wrap="none" lIns="140671" tIns="70336" rIns="140671" bIns="70336" rtlCol="0">
+            <a:spAutoFit/>
+          </a:bodyPr>
+          <a:lstStyle/>
+          <a:p>
+            <a:r>
+              <a:rPr kumimoji="1" lang="en-US" altLang="ja-JP" sz="1400" b="1" dirty="0">
+                <a:latin typeface="メイリオ"/>
+                <a:ea typeface="メイリオ"/>
+                <a:cs typeface="メイリオ"/>
+              </a:rPr>
+              <a:t>Screen Layout</a:t>
+            </a:r>
+            <a:endParaRPr kumimoji="1" lang="ja-JP" altLang="en-US" sz="1400" b="1" dirty="0">
+              <a:latin typeface="メイリオ"/>
+              <a:ea typeface="メイリオ"/>
+              <a:cs typeface="メイリオ"/>
+            </a:endParaRPr>
+          </a:p>
+        </p:txBody>
+      </p:sp>
+      <p:graphicFrame>
+        <p:nvGraphicFramePr>
+          <p:cNvPr id="43" name="表 8"/>
+          <p:cNvGraphicFramePr>
+            <a:graphicFrameLocks noGrp="1"/>
+          </p:cNvGraphicFramePr>
+          <p:nvPr>
+            <p:extLst>
+              <p:ext uri="{D42A27DB-BD31-4B8C-83A1-F6EECF244321}">
+                <p14:modId xmlns:p14="http://schemas.microsoft.com/office/powerpoint/2010/main" val="1653954384"/>
+              </p:ext>
+            </p:extLst>
+          </p:nvPr>
+        </p:nvGraphicFramePr>
+        <p:xfrm>
+          <a:off x="45823" y="6004561"/>
+          <a:ext cx="6592717" cy="1512732"/>
+        </p:xfrm>
+        <a:graphic>
+          <a:graphicData uri="http://schemas.openxmlformats.org/drawingml/2006/table">
+            <a:tbl>
+              <a:tblPr firstRow="1" bandRow="1">
+                <a:tableStyleId>{69012ECD-51FC-41F1-AA8D-1B2483CD663E}</a:tableStyleId>
+              </a:tblPr>
+              <a:tblGrid>
+                <a:gridCol w="376445"/>
+                <a:gridCol w="1359520"/>
+                <a:gridCol w="4856752"/>
+              </a:tblGrid>
+              <a:tr h="327077">
+                <a:tc>
+                  <a:txBody>
+                    <a:bodyPr/>
+                    <a:lstStyle/>
+                    <a:p>
+                      <a:pPr algn="ctr"/>
+                      <a:r>
+                        <a:rPr kumimoji="1" lang="en-US" altLang="ja-JP" sz="1000" dirty="0" smtClean="0"/>
+                        <a:t>No</a:t>
+                      </a:r>
+                      <a:endParaRPr kumimoji="1" lang="ja-JP" altLang="en-US" sz="1000" b="0" dirty="0">
+                        <a:solidFill>
+                          <a:schemeClr val="tx1"/>
+                        </a:solidFill>
+                      </a:endParaRPr>
+                    </a:p>
+                  </a:txBody>
+                  <a:tcPr marL="104503" marR="104503" anchor="ctr"/>
+                </a:tc>
+                <a:tc>
+                  <a:txBody>
+                    <a:bodyPr/>
+                    <a:lstStyle/>
+                    <a:p>
+                      <a:pPr algn="ctr"/>
+                      <a:r>
+                        <a:rPr kumimoji="1" lang="en-US" altLang="ja-JP" sz="1000" dirty="0" smtClean="0"/>
+                        <a:t>Control</a:t>
+                      </a:r>
+                      <a:r>
+                        <a:rPr kumimoji="1" lang="en-US" altLang="ja-JP" sz="1000" baseline="0" dirty="0" smtClean="0"/>
+                        <a:t> </a:t>
+                      </a:r>
+                      <a:r>
+                        <a:rPr kumimoji="1" lang="en-US" altLang="ja-JP" sz="1000" dirty="0" smtClean="0"/>
+                        <a:t>Name</a:t>
+                      </a:r>
+                      <a:endParaRPr kumimoji="1" lang="ja-JP" altLang="en-US" sz="1000" b="0" dirty="0">
+                        <a:solidFill>
+                          <a:schemeClr val="tx1"/>
+                        </a:solidFill>
+                      </a:endParaRPr>
+                    </a:p>
+                  </a:txBody>
+                  <a:tcPr marL="104503" marR="104503" anchor="ctr"/>
+                </a:tc>
+                <a:tc>
+                  <a:txBody>
+                    <a:bodyPr/>
+                    <a:lstStyle/>
+                    <a:p>
+                      <a:pPr algn="ctr"/>
+                      <a:r>
+                        <a:rPr kumimoji="1" lang="en-US" altLang="ja-JP" sz="1000" dirty="0" smtClean="0"/>
+                        <a:t>Outline</a:t>
+                      </a:r>
+                      <a:r>
+                        <a:rPr kumimoji="1" lang="en-US" altLang="ja-JP" sz="1000" baseline="0" dirty="0" smtClean="0"/>
+                        <a:t> of processing</a:t>
+                      </a:r>
+                      <a:endParaRPr kumimoji="1" lang="ja-JP" altLang="en-US" sz="1000" b="0" dirty="0">
+                        <a:solidFill>
+                          <a:schemeClr val="tx1"/>
+                        </a:solidFill>
+                      </a:endParaRPr>
+                    </a:p>
+                  </a:txBody>
+                  <a:tcPr marL="104503" marR="104503" anchor="ctr"/>
+                </a:tc>
+              </a:tr>
+              <a:tr h="327077">
+                <a:tc>
+                  <a:txBody>
+                    <a:bodyPr/>
+                    <a:lstStyle/>
+                    <a:p>
+                      <a:pPr algn="ctr"/>
+                      <a:r>
+                        <a:rPr kumimoji="1" lang="en-US" altLang="ja-JP" sz="1000" dirty="0" smtClean="0"/>
+                        <a:t>#1</a:t>
+                      </a:r>
+                      <a:endParaRPr kumimoji="1" lang="ja-JP" altLang="en-US" sz="1000" b="0" dirty="0"/>
+                    </a:p>
+                  </a:txBody>
+                  <a:tcPr marL="104503" marR="104503" anchor="ctr"/>
+                </a:tc>
+                <a:tc>
+                  <a:txBody>
+                    <a:bodyPr/>
+                    <a:lstStyle/>
+                    <a:p>
+                      <a:r>
+                        <a:rPr kumimoji="1" lang="en-US" altLang="ja-JP" sz="1000" b="0" dirty="0" smtClean="0"/>
+                        <a:t>Post</a:t>
+                      </a:r>
+                      <a:r>
+                        <a:rPr kumimoji="1" lang="en-US" altLang="ja-JP" sz="1000" b="0" baseline="0" dirty="0" smtClean="0"/>
+                        <a:t> </a:t>
+                      </a:r>
+                      <a:r>
+                        <a:rPr kumimoji="1" lang="en-US" altLang="ja-JP" sz="1000" b="0" baseline="0" dirty="0" err="1" smtClean="0"/>
+                        <a:t>conent</a:t>
+                      </a:r>
+                      <a:endParaRPr kumimoji="1" lang="ja-JP" altLang="en-US" sz="1000" b="0" dirty="0"/>
+                    </a:p>
+                  </a:txBody>
+                  <a:tcPr marL="104503" marR="104503" anchor="ctr"/>
+                </a:tc>
+                <a:tc>
+                  <a:txBody>
+                    <a:bodyPr/>
+                    <a:lstStyle/>
+                    <a:p>
+                      <a:r>
+                        <a:rPr kumimoji="1" lang="en-US" altLang="ja-JP" sz="1000" baseline="0" dirty="0" smtClean="0"/>
+                        <a:t>Put the </a:t>
+                      </a:r>
+                      <a:r>
+                        <a:rPr kumimoji="1" lang="en-US" altLang="ja-JP" sz="1000" baseline="0" dirty="0" smtClean="0"/>
+                        <a:t>content of post/comment here.</a:t>
+                      </a:r>
+                      <a:endParaRPr kumimoji="1" lang="ja-JP" altLang="en-US" sz="1000" b="0" dirty="0"/>
+                    </a:p>
+                  </a:txBody>
+                  <a:tcPr marL="104503" marR="104503"/>
+                </a:tc>
+              </a:tr>
+              <a:tr h="327077">
+                <a:tc>
+                  <a:txBody>
+                    <a:bodyPr/>
+                    <a:lstStyle/>
+                    <a:p>
+                      <a:pPr algn="ctr"/>
+                      <a:r>
+                        <a:rPr kumimoji="1" lang="en-US" altLang="ja-JP" sz="1000" dirty="0" smtClean="0"/>
+                        <a:t>#2</a:t>
+                      </a:r>
+                      <a:endParaRPr kumimoji="1" lang="ja-JP" altLang="en-US" sz="1000" b="0" dirty="0"/>
+                    </a:p>
+                  </a:txBody>
+                  <a:tcPr marL="104503" marR="104503" anchor="ctr"/>
+                </a:tc>
+                <a:tc>
+                  <a:txBody>
+                    <a:bodyPr/>
+                    <a:lstStyle/>
+                    <a:p>
+                      <a:r>
+                        <a:rPr kumimoji="1" lang="en-US" altLang="ja-JP" sz="1000" b="0" dirty="0" smtClean="0"/>
+                        <a:t>Done</a:t>
+                      </a:r>
+                      <a:endParaRPr kumimoji="1" lang="ja-JP" altLang="en-US" sz="1000" b="0" dirty="0"/>
+                    </a:p>
+                  </a:txBody>
+                  <a:tcPr marL="104503" marR="104503" anchor="ctr"/>
+                </a:tc>
+                <a:tc>
+                  <a:txBody>
+                    <a:bodyPr/>
+                    <a:lstStyle/>
+                    <a:p>
+                      <a:r>
+                        <a:rPr kumimoji="1" lang="en-US" altLang="ja-JP" sz="1000" dirty="0" smtClean="0"/>
+                        <a:t>When the post content is finish</a:t>
+                      </a:r>
+                      <a:r>
+                        <a:rPr kumimoji="1" lang="en-US" altLang="ja-JP" sz="1000" baseline="0" dirty="0" smtClean="0"/>
+                        <a:t> click here to up</a:t>
+                      </a:r>
+                      <a:r>
+                        <a:rPr kumimoji="1" lang="en-US" altLang="ja-JP" sz="1000" dirty="0" smtClean="0"/>
+                        <a:t>.</a:t>
+                      </a:r>
+                      <a:endParaRPr kumimoji="1" lang="ja-JP" altLang="en-US" sz="1000" b="0" dirty="0"/>
+                    </a:p>
+                  </a:txBody>
+                  <a:tcPr marL="104503" marR="104503"/>
+                </a:tc>
+              </a:tr>
+              <a:tr h="531501">
+                <a:tc>
+                  <a:txBody>
+                    <a:bodyPr/>
+                    <a:lstStyle/>
+                    <a:p>
+                      <a:pPr algn="ctr"/>
+                      <a:r>
+                        <a:rPr kumimoji="1" lang="en-US" altLang="ja-JP" sz="1000" dirty="0" smtClean="0"/>
+                        <a:t>#3</a:t>
+                      </a:r>
+                      <a:endParaRPr kumimoji="1" lang="ja-JP" altLang="en-US" sz="1000" b="0" dirty="0"/>
+                    </a:p>
+                  </a:txBody>
+                  <a:tcPr marL="104503" marR="104503" anchor="ctr"/>
+                </a:tc>
+                <a:tc>
+                  <a:txBody>
+                    <a:bodyPr/>
+                    <a:lstStyle/>
+                    <a:p>
+                      <a:r>
+                        <a:rPr kumimoji="1" lang="en-US" altLang="ja-JP" sz="1000" dirty="0" smtClean="0"/>
+                        <a:t>Cancel button</a:t>
+                      </a:r>
+                      <a:endParaRPr kumimoji="1" lang="ja-JP" altLang="en-US" sz="1000" b="0" dirty="0"/>
+                    </a:p>
+                  </a:txBody>
+                  <a:tcPr marL="104503" marR="104503" anchor="ctr"/>
+                </a:tc>
+                <a:tc>
+                  <a:txBody>
+                    <a:bodyPr/>
+                    <a:lstStyle/>
+                    <a:p>
+                      <a:r>
+                        <a:rPr kumimoji="1" lang="en-US" altLang="ja-JP" sz="1000" dirty="0" smtClean="0"/>
+                        <a:t>When user</a:t>
+                      </a:r>
+                      <a:r>
+                        <a:rPr kumimoji="1" lang="en-US" altLang="ja-JP" sz="1000" baseline="0" dirty="0" smtClean="0"/>
+                        <a:t> want </a:t>
+                      </a:r>
+                      <a:r>
+                        <a:rPr kumimoji="1" lang="en-US" altLang="ja-JP" sz="1000" baseline="0" dirty="0" smtClean="0"/>
+                        <a:t>cancel up a post, </a:t>
+                      </a:r>
+                      <a:r>
+                        <a:rPr kumimoji="1" lang="en-US" altLang="ja-JP" sz="1000" baseline="0" dirty="0" smtClean="0"/>
+                        <a:t>click here. </a:t>
+                      </a:r>
+                      <a:endParaRPr kumimoji="1" lang="ja-JP" altLang="en-US" sz="1000" b="0" dirty="0"/>
+                    </a:p>
+                  </a:txBody>
+                  <a:tcPr marL="104503" marR="104503"/>
+                </a:tc>
+              </a:tr>
+            </a:tbl>
+          </a:graphicData>
+        </a:graphic>
+      </p:graphicFrame>
+      <p:grpSp>
+        <p:nvGrpSpPr>
+          <p:cNvPr id="44" name="Group 43"/>
+          <p:cNvGrpSpPr/>
+          <p:nvPr/>
+        </p:nvGrpSpPr>
+        <p:grpSpPr>
+          <a:xfrm>
+            <a:off x="0" y="0"/>
+            <a:ext cx="6858000" cy="395076"/>
+            <a:chOff x="-13160" y="0"/>
+            <a:chExt cx="9164506" cy="295929"/>
+          </a:xfrm>
+          <a:solidFill>
+            <a:srgbClr val="FFFFFF"/>
+          </a:solidFill>
+        </p:grpSpPr>
+        <p:sp>
+          <p:nvSpPr>
+            <p:cNvPr id="45" name="Rectangle 44"/>
+            <p:cNvSpPr/>
+            <p:nvPr/>
+          </p:nvSpPr>
+          <p:spPr>
+            <a:xfrm>
+              <a:off x="-13160" y="0"/>
+              <a:ext cx="7656732" cy="295929"/>
+            </a:xfrm>
+            <a:prstGeom prst="rect">
+              <a:avLst/>
+            </a:prstGeom>
+            <a:grpFill/>
+            <a:ln>
+              <a:solidFill>
+                <a:srgbClr val="000000"/>
+              </a:solidFill>
+            </a:ln>
+            <a:effectLst/>
+          </p:spPr>
+          <p:style>
+            <a:lnRef idx="0">
+              <a:schemeClr val="accent1"/>
+            </a:lnRef>
+            <a:fillRef idx="3">
+              <a:schemeClr val="accent1"/>
+            </a:fillRef>
+            <a:effectRef idx="3">
+              <a:schemeClr val="accent1"/>
+            </a:effectRef>
+            <a:fontRef idx="minor">
+              <a:schemeClr val="lt1"/>
+            </a:fontRef>
+          </p:style>
+          <p:txBody>
+            <a:bodyPr rtlCol="0" anchor="ctr"/>
+            <a:lstStyle/>
+            <a:p>
+              <a:r>
+                <a:rPr lang="en-US" sz="1800" dirty="0" smtClean="0">
+                  <a:solidFill>
+                    <a:srgbClr val="000000"/>
+                  </a:solidFill>
+                </a:rPr>
+                <a:t>Compose a post/comment</a:t>
+              </a:r>
+              <a:endParaRPr lang="en-US" sz="1800" dirty="0">
+                <a:solidFill>
+                  <a:srgbClr val="000000"/>
+                </a:solidFill>
+              </a:endParaRPr>
+            </a:p>
+          </p:txBody>
+        </p:sp>
+        <p:sp>
+          <p:nvSpPr>
+            <p:cNvPr id="46" name="Rectangle 45"/>
+            <p:cNvSpPr/>
+            <p:nvPr/>
+          </p:nvSpPr>
+          <p:spPr>
+            <a:xfrm>
+              <a:off x="7692892" y="0"/>
+              <a:ext cx="1458454" cy="295929"/>
+            </a:xfrm>
+            <a:prstGeom prst="rect">
+              <a:avLst/>
+            </a:prstGeom>
+            <a:grpFill/>
+            <a:ln>
+              <a:solidFill>
+                <a:srgbClr val="000000"/>
+              </a:solidFill>
+            </a:ln>
+            <a:effectLst/>
+          </p:spPr>
+          <p:style>
+            <a:lnRef idx="1">
+              <a:schemeClr val="accent3"/>
+            </a:lnRef>
+            <a:fillRef idx="3">
+              <a:schemeClr val="accent3"/>
+            </a:fillRef>
+            <a:effectRef idx="2">
+              <a:schemeClr val="accent3"/>
+            </a:effectRef>
+            <a:fontRef idx="minor">
+              <a:schemeClr val="lt1"/>
+            </a:fontRef>
+          </p:style>
+          <p:txBody>
+            <a:bodyPr rtlCol="0" anchor="ctr"/>
+            <a:lstStyle/>
+            <a:p>
+              <a:r>
+                <a:rPr lang="en-US" dirty="0" smtClean="0">
+                  <a:solidFill>
+                    <a:srgbClr val="000000"/>
+                  </a:solidFill>
+                </a:rPr>
+                <a:t>ID:003</a:t>
+              </a:r>
+              <a:endParaRPr lang="en-US" sz="1800" dirty="0">
+                <a:solidFill>
+                  <a:srgbClr val="000000"/>
+                </a:solidFill>
+              </a:endParaRPr>
+            </a:p>
+          </p:txBody>
+        </p:sp>
+      </p:grpSp>
+      <p:sp>
+        <p:nvSpPr>
+          <p:cNvPr id="18" name="TextBox 17"/>
+          <p:cNvSpPr txBox="1"/>
+          <p:nvPr/>
+        </p:nvSpPr>
+        <p:spPr>
+          <a:xfrm>
+            <a:off x="548640" y="-355600"/>
+            <a:ext cx="184666" cy="369332"/>
+          </a:xfrm>
+          <a:prstGeom prst="rect">
+            <a:avLst/>
+          </a:prstGeom>
+          <a:noFill/>
+        </p:spPr>
+        <p:txBody>
+          <a:bodyPr wrap="none" rtlCol="0">
+            <a:spAutoFit/>
+          </a:bodyPr>
+          <a:lstStyle/>
+          <a:p>
+            <a:endParaRPr lang="en-US" dirty="0"/>
+          </a:p>
+        </p:txBody>
+      </p:sp>
+      <p:cxnSp>
+        <p:nvCxnSpPr>
+          <p:cNvPr id="49" name="Straight Arrow Connector 48"/>
+          <p:cNvCxnSpPr>
+            <a:endCxn id="50" idx="3"/>
+          </p:cNvCxnSpPr>
+          <p:nvPr/>
+        </p:nvCxnSpPr>
+        <p:spPr>
+          <a:xfrm flipH="1">
+            <a:off x="1938208" y="2758835"/>
+            <a:ext cx="511179" cy="6865"/>
+          </a:xfrm>
+          <a:prstGeom prst="straightConnector1">
+            <a:avLst/>
+          </a:prstGeom>
+          <a:ln w="3175" cmpd="sng">
+            <a:solidFill>
+              <a:srgbClr val="000000"/>
+            </a:solidFill>
+            <a:headEnd type="none"/>
+            <a:tailEnd type="arrow"/>
+          </a:ln>
+          <a:effectLst/>
+        </p:spPr>
+        <p:style>
+          <a:lnRef idx="2">
+            <a:schemeClr val="accent1"/>
+          </a:lnRef>
+          <a:fillRef idx="0">
+            <a:schemeClr val="accent1"/>
+          </a:fillRef>
+          <a:effectRef idx="1">
+            <a:schemeClr val="accent1"/>
+          </a:effectRef>
+          <a:fontRef idx="minor">
+            <a:schemeClr val="tx1"/>
+          </a:fontRef>
+        </p:style>
+      </p:cxnSp>
+      <p:sp>
+        <p:nvSpPr>
+          <p:cNvPr id="50" name="TextBox 49"/>
+          <p:cNvSpPr txBox="1"/>
+          <p:nvPr/>
+        </p:nvSpPr>
+        <p:spPr>
+          <a:xfrm>
+            <a:off x="1521583" y="2581034"/>
+            <a:ext cx="416625" cy="369332"/>
+          </a:xfrm>
+          <a:prstGeom prst="rect">
+            <a:avLst/>
+          </a:prstGeom>
+          <a:noFill/>
+        </p:spPr>
+        <p:txBody>
+          <a:bodyPr wrap="none" rtlCol="0">
+            <a:spAutoFit/>
+          </a:bodyPr>
+          <a:lstStyle/>
+          <a:p>
+            <a:r>
+              <a:rPr lang="en-US" dirty="0" smtClean="0"/>
+              <a:t>#2</a:t>
+            </a:r>
+            <a:endParaRPr lang="en-US" dirty="0"/>
+          </a:p>
+        </p:txBody>
+      </p:sp>
+      <p:sp>
+        <p:nvSpPr>
+          <p:cNvPr id="51" name="TextBox 50"/>
+          <p:cNvSpPr txBox="1"/>
+          <p:nvPr/>
+        </p:nvSpPr>
+        <p:spPr>
+          <a:xfrm>
+            <a:off x="5521387" y="2568334"/>
+            <a:ext cx="416625" cy="369332"/>
+          </a:xfrm>
+          <a:prstGeom prst="rect">
+            <a:avLst/>
+          </a:prstGeom>
+          <a:noFill/>
+        </p:spPr>
+        <p:txBody>
+          <a:bodyPr wrap="none" rtlCol="0">
+            <a:spAutoFit/>
+          </a:bodyPr>
+          <a:lstStyle/>
+          <a:p>
+            <a:r>
+              <a:rPr lang="en-US" dirty="0" smtClean="0"/>
+              <a:t>#3</a:t>
+            </a:r>
+            <a:endParaRPr lang="en-US" dirty="0"/>
+          </a:p>
+        </p:txBody>
+      </p:sp>
+      <p:cxnSp>
+        <p:nvCxnSpPr>
+          <p:cNvPr id="52" name="Straight Arrow Connector 51"/>
+          <p:cNvCxnSpPr/>
+          <p:nvPr/>
+        </p:nvCxnSpPr>
+        <p:spPr>
+          <a:xfrm>
+            <a:off x="4951748" y="2756375"/>
+            <a:ext cx="609600" cy="0"/>
+          </a:xfrm>
+          <a:prstGeom prst="straightConnector1">
+            <a:avLst/>
+          </a:prstGeom>
+          <a:ln w="3175" cmpd="sng">
+            <a:solidFill>
+              <a:srgbClr val="000000"/>
+            </a:solidFill>
+            <a:headEnd type="none"/>
+            <a:tailEnd type="arrow"/>
+          </a:ln>
+          <a:effectLst/>
+        </p:spPr>
+        <p:style>
+          <a:lnRef idx="2">
+            <a:schemeClr val="accent1"/>
+          </a:lnRef>
+          <a:fillRef idx="0">
+            <a:schemeClr val="accent1"/>
+          </a:fillRef>
+          <a:effectRef idx="1">
+            <a:schemeClr val="accent1"/>
+          </a:effectRef>
+          <a:fontRef idx="minor">
+            <a:schemeClr val="tx1"/>
+          </a:fontRef>
+        </p:style>
+      </p:cxnSp>
+      <p:sp>
+        <p:nvSpPr>
+          <p:cNvPr id="53" name="TextBox 52"/>
+          <p:cNvSpPr txBox="1"/>
+          <p:nvPr/>
+        </p:nvSpPr>
+        <p:spPr>
+          <a:xfrm>
+            <a:off x="1501115" y="1750749"/>
+            <a:ext cx="1812215" cy="323608"/>
+          </a:xfrm>
+          <a:prstGeom prst="rect">
+            <a:avLst/>
+          </a:prstGeom>
+          <a:noFill/>
+        </p:spPr>
+        <p:txBody>
+          <a:bodyPr wrap="none" rtlCol="0">
+            <a:spAutoFit/>
+          </a:bodyPr>
+          <a:lstStyle/>
+          <a:p>
+            <a:r>
+              <a:rPr lang="en-US" dirty="0" smtClean="0"/>
+              <a:t>Today’s Great …..</a:t>
+            </a:r>
+            <a:endParaRPr lang="en-US" dirty="0"/>
+          </a:p>
+        </p:txBody>
+      </p:sp>
+    </p:spTree>
+    <p:extLst>
+      <p:ext uri="{BB962C8B-B14F-4D97-AF65-F5344CB8AC3E}">
+        <p14:creationId xmlns:p14="http://schemas.microsoft.com/office/powerpoint/2010/main" val="783687891"/>
       </p:ext>
     </p:extLst>
   </p:cSld>

</xml_diff>